<commit_message>
Added Data Driven (Parameterized) unit tests
</commit_message>
<xml_diff>
--- a/Data Structures.pptx
+++ b/Data Structures.pptx
@@ -5,7 +5,7 @@
     <p:sldMasterId id="2147483648" r:id="rId1"/>
   </p:sldMasterIdLst>
   <p:notesMasterIdLst>
-    <p:notesMasterId r:id="rId8"/>
+    <p:notesMasterId r:id="rId11"/>
   </p:notesMasterIdLst>
   <p:sldIdLst>
     <p:sldId id="256" r:id="rId2"/>
@@ -14,6 +14,9 @@
     <p:sldId id="260" r:id="rId5"/>
     <p:sldId id="259" r:id="rId6"/>
     <p:sldId id="261" r:id="rId7"/>
+    <p:sldId id="262" r:id="rId8"/>
+    <p:sldId id="264" r:id="rId9"/>
+    <p:sldId id="263" r:id="rId10"/>
   </p:sldIdLst>
   <p:sldSz cx="12192000" cy="6858000"/>
   <p:notesSz cx="6858000" cy="9144000"/>
@@ -129,10 +132,6 @@
     </p:ext>
   </p:extLst>
 </p:presentation>
-</file>
-
-<file path=ppt/revisionInfo.xml><?xml version="1.0" encoding="utf-8"?>
-<p1510:revInfo xmlns:a="http://schemas.openxmlformats.org/drawingml/2006/main" xmlns:r="http://schemas.openxmlformats.org/officeDocument/2006/relationships" xmlns:p1510="http://schemas.microsoft.com/office/powerpoint/2015/10/main"/>
 </file>
 
 <file path=ppt/changesInfos/changesInfo1.xml><?xml version="1.0" encoding="utf-8"?>
@@ -962,7 +961,7 @@
           <a:p>
             <a:fld id="{138E3CF0-6B99-4E8C-932B-4ED36CDE0334}" type="datetimeFigureOut">
               <a:rPr lang="en-US" smtClean="0"/>
-              <a:t>5/3/2019</a:t>
+              <a:t>5/11/2020</a:t>
             </a:fld>
             <a:endParaRPr lang="en-US"/>
           </a:p>
@@ -1376,7 +1375,7 @@
           <a:p>
             <a:fld id="{419BCAD6-7BA0-4587-8C01-8660A853C6C0}" type="datetime1">
               <a:rPr lang="en-US" smtClean="0"/>
-              <a:t>5/3/2019</a:t>
+              <a:t>5/11/2020</a:t>
             </a:fld>
             <a:endParaRPr lang="en-US"/>
           </a:p>
@@ -1578,7 +1577,7 @@
           <a:p>
             <a:fld id="{D9243363-F57F-4F91-B6B6-20A8F7D71593}" type="datetime1">
               <a:rPr lang="en-US" smtClean="0"/>
-              <a:t>5/3/2019</a:t>
+              <a:t>5/11/2020</a:t>
             </a:fld>
             <a:endParaRPr lang="en-US"/>
           </a:p>
@@ -1790,7 +1789,7 @@
           <a:p>
             <a:fld id="{396ECC72-5620-47AE-8D65-699B2E3A299F}" type="datetime1">
               <a:rPr lang="en-US" smtClean="0"/>
-              <a:t>5/3/2019</a:t>
+              <a:t>5/11/2020</a:t>
             </a:fld>
             <a:endParaRPr lang="en-US"/>
           </a:p>
@@ -1992,7 +1991,7 @@
           <a:p>
             <a:fld id="{672E4F02-D405-4EE0-9385-823E83172ED8}" type="datetime1">
               <a:rPr lang="en-US" smtClean="0"/>
-              <a:t>5/3/2019</a:t>
+              <a:t>5/11/2020</a:t>
             </a:fld>
             <a:endParaRPr lang="en-US"/>
           </a:p>
@@ -2271,7 +2270,7 @@
           <a:p>
             <a:fld id="{937E7BC9-3590-4184-A3D8-302A1D1FF671}" type="datetime1">
               <a:rPr lang="en-US" smtClean="0"/>
-              <a:t>5/3/2019</a:t>
+              <a:t>5/11/2020</a:t>
             </a:fld>
             <a:endParaRPr lang="en-US"/>
           </a:p>
@@ -2540,7 +2539,7 @@
           <a:p>
             <a:fld id="{82A83225-D197-41FB-AF0B-C891637C2C29}" type="datetime1">
               <a:rPr lang="en-US" smtClean="0"/>
-              <a:t>5/3/2019</a:t>
+              <a:t>5/11/2020</a:t>
             </a:fld>
             <a:endParaRPr lang="en-US"/>
           </a:p>
@@ -2956,7 +2955,7 @@
           <a:p>
             <a:fld id="{5E4D5225-11F4-4F95-A8C3-B79C39E596A7}" type="datetime1">
               <a:rPr lang="en-US" smtClean="0"/>
-              <a:t>5/3/2019</a:t>
+              <a:t>5/11/2020</a:t>
             </a:fld>
             <a:endParaRPr lang="en-US"/>
           </a:p>
@@ -3101,7 +3100,7 @@
           <a:p>
             <a:fld id="{556EAC47-5AFE-462C-B878-A184C4B347EC}" type="datetime1">
               <a:rPr lang="en-US" smtClean="0"/>
-              <a:t>5/3/2019</a:t>
+              <a:t>5/11/2020</a:t>
             </a:fld>
             <a:endParaRPr lang="en-US"/>
           </a:p>
@@ -3218,7 +3217,7 @@
           <a:p>
             <a:fld id="{BFF38DF8-E008-494F-9FFE-F5C877C08086}" type="datetime1">
               <a:rPr lang="en-US" smtClean="0"/>
-              <a:t>5/3/2019</a:t>
+              <a:t>5/11/2020</a:t>
             </a:fld>
             <a:endParaRPr lang="en-US"/>
           </a:p>
@@ -3533,7 +3532,7 @@
           <a:p>
             <a:fld id="{4F82D780-B185-48E9-87B5-2DA5FEADB8A6}" type="datetime1">
               <a:rPr lang="en-US" smtClean="0"/>
-              <a:t>5/3/2019</a:t>
+              <a:t>5/11/2020</a:t>
             </a:fld>
             <a:endParaRPr lang="en-US"/>
           </a:p>
@@ -3825,7 +3824,7 @@
           <a:p>
             <a:fld id="{641B011A-0C88-49D0-B059-7DB69B79BE87}" type="datetime1">
               <a:rPr lang="en-US" smtClean="0"/>
-              <a:t>5/3/2019</a:t>
+              <a:t>5/11/2020</a:t>
             </a:fld>
             <a:endParaRPr lang="en-US"/>
           </a:p>
@@ -4070,7 +4069,7 @@
           <a:p>
             <a:fld id="{17354C85-3AE2-4DFC-B6B9-7F56CA5F7D40}" type="datetime1">
               <a:rPr lang="en-US" smtClean="0"/>
-              <a:t>5/3/2019</a:t>
+              <a:t>5/11/2020</a:t>
             </a:fld>
             <a:endParaRPr lang="en-US"/>
           </a:p>
@@ -13840,6 +13839,2439 @@
 </p:sld>
 </file>
 
+<file path=ppt/slides/slide7.xml><?xml version="1.0" encoding="utf-8"?>
+<p:sld xmlns:a="http://schemas.openxmlformats.org/drawingml/2006/main" xmlns:r="http://schemas.openxmlformats.org/officeDocument/2006/relationships" xmlns:p="http://schemas.openxmlformats.org/presentationml/2006/main">
+  <p:cSld>
+    <p:spTree>
+      <p:nvGrpSpPr>
+        <p:cNvPr id="1" name=""/>
+        <p:cNvGrpSpPr/>
+        <p:nvPr/>
+      </p:nvGrpSpPr>
+      <p:grpSpPr>
+        <a:xfrm>
+          <a:off x="0" y="0"/>
+          <a:ext cx="0" cy="0"/>
+          <a:chOff x="0" y="0"/>
+          <a:chExt cx="0" cy="0"/>
+        </a:xfrm>
+      </p:grpSpPr>
+      <p:sp>
+        <p:nvSpPr>
+          <p:cNvPr id="2" name="Title 1">
+            <a:extLst>
+              <a:ext uri="{FF2B5EF4-FFF2-40B4-BE49-F238E27FC236}">
+                <a16:creationId xmlns:a16="http://schemas.microsoft.com/office/drawing/2014/main" id="{7AE9DA6F-CEDE-4D14-9604-ADFA660EAFB3}"/>
+              </a:ext>
+            </a:extLst>
+          </p:cNvPr>
+          <p:cNvSpPr>
+            <a:spLocks noGrp="1"/>
+          </p:cNvSpPr>
+          <p:nvPr>
+            <p:ph type="ctrTitle"/>
+          </p:nvPr>
+        </p:nvSpPr>
+        <p:spPr>
+          <a:xfrm>
+            <a:off x="1506513" y="22019"/>
+            <a:ext cx="9144000" cy="1086374"/>
+          </a:xfrm>
+        </p:spPr>
+        <p:txBody>
+          <a:bodyPr>
+            <a:normAutofit/>
+          </a:bodyPr>
+          <a:lstStyle/>
+          <a:p>
+            <a:r>
+              <a:rPr lang="en-US" dirty="0">
+                <a:latin typeface="Segoe UI Light" panose="020B0502040204020203" pitchFamily="34" charset="0"/>
+                <a:cs typeface="Segoe UI Light" panose="020B0502040204020203" pitchFamily="34" charset="0"/>
+              </a:rPr>
+              <a:t>Requirements</a:t>
+            </a:r>
+          </a:p>
+        </p:txBody>
+      </p:sp>
+      <p:sp>
+        <p:nvSpPr>
+          <p:cNvPr id="4" name="Footer Placeholder 3">
+            <a:extLst>
+              <a:ext uri="{FF2B5EF4-FFF2-40B4-BE49-F238E27FC236}">
+                <a16:creationId xmlns:a16="http://schemas.microsoft.com/office/drawing/2014/main" id="{CD58CCA0-B819-401E-8411-15D72948A673}"/>
+              </a:ext>
+            </a:extLst>
+          </p:cNvPr>
+          <p:cNvSpPr>
+            <a:spLocks noGrp="1"/>
+          </p:cNvSpPr>
+          <p:nvPr>
+            <p:ph type="ftr" sz="quarter" idx="11"/>
+          </p:nvPr>
+        </p:nvSpPr>
+        <p:spPr>
+          <a:xfrm>
+            <a:off x="2778641" y="6492446"/>
+            <a:ext cx="6629400" cy="365125"/>
+          </a:xfrm>
+        </p:spPr>
+        <p:txBody>
+          <a:bodyPr/>
+          <a:lstStyle/>
+          <a:p>
+            <a:r>
+              <a:rPr lang="pt-BR" sz="1400" b="1" dirty="0">
+                <a:latin typeface="Segoe UI Light" panose="020B0502040204020203" pitchFamily="34" charset="0"/>
+                <a:cs typeface="Segoe UI Light" panose="020B0502040204020203" pitchFamily="34" charset="0"/>
+              </a:rPr>
+              <a:t>Blog</a:t>
+            </a:r>
+            <a:r>
+              <a:rPr lang="pt-BR" sz="1400" dirty="0">
+                <a:latin typeface="Segoe UI Light" panose="020B0502040204020203" pitchFamily="34" charset="0"/>
+                <a:cs typeface="Segoe UI Light" panose="020B0502040204020203" pitchFamily="34" charset="0"/>
+              </a:rPr>
+              <a:t>: http://www.matlus.com       </a:t>
+            </a:r>
+            <a:r>
+              <a:rPr lang="pt-BR" sz="1400" b="1" dirty="0">
+                <a:latin typeface="Segoe UI Light" panose="020B0502040204020203" pitchFamily="34" charset="0"/>
+                <a:cs typeface="Segoe UI Light" panose="020B0502040204020203" pitchFamily="34" charset="0"/>
+              </a:rPr>
+              <a:t>YouTube</a:t>
+            </a:r>
+            <a:r>
+              <a:rPr lang="pt-BR" sz="1400" dirty="0">
+                <a:latin typeface="Segoe UI Light" panose="020B0502040204020203" pitchFamily="34" charset="0"/>
+                <a:cs typeface="Segoe UI Light" panose="020B0502040204020203" pitchFamily="34" charset="0"/>
+              </a:rPr>
+              <a:t>: https://youtube.com/matlus</a:t>
+            </a:r>
+            <a:endParaRPr lang="en-US" sz="1400" dirty="0">
+              <a:latin typeface="Segoe UI Light" panose="020B0502040204020203" pitchFamily="34" charset="0"/>
+              <a:cs typeface="Segoe UI Light" panose="020B0502040204020203" pitchFamily="34" charset="0"/>
+            </a:endParaRPr>
+          </a:p>
+        </p:txBody>
+      </p:sp>
+      <p:sp>
+        <p:nvSpPr>
+          <p:cNvPr id="5" name="Title 1">
+            <a:extLst>
+              <a:ext uri="{FF2B5EF4-FFF2-40B4-BE49-F238E27FC236}">
+                <a16:creationId xmlns:a16="http://schemas.microsoft.com/office/drawing/2014/main" id="{2B8725F8-751C-4B8D-9BAD-6A2858BC8A5D}"/>
+              </a:ext>
+            </a:extLst>
+          </p:cNvPr>
+          <p:cNvSpPr txBox="1">
+            <a:spLocks/>
+          </p:cNvSpPr>
+          <p:nvPr/>
+        </p:nvSpPr>
+        <p:spPr>
+          <a:xfrm>
+            <a:off x="4376944" y="1093105"/>
+            <a:ext cx="3445788" cy="647711"/>
+          </a:xfrm>
+          <a:prstGeom prst="rect">
+            <a:avLst/>
+          </a:prstGeom>
+        </p:spPr>
+        <p:txBody>
+          <a:bodyPr vert="horz" lIns="91440" tIns="45720" rIns="91440" bIns="45720" rtlCol="0" anchor="b">
+            <a:normAutofit fontScale="85000" lnSpcReduction="10000"/>
+          </a:bodyPr>
+          <a:lstStyle>
+            <a:lvl1pPr algn="ctr" defTabSz="914400" rtl="0" eaLnBrk="1" latinLnBrk="0" hangingPunct="1">
+              <a:lnSpc>
+                <a:spcPct val="90000"/>
+              </a:lnSpc>
+              <a:spcBef>
+                <a:spcPct val="0"/>
+              </a:spcBef>
+              <a:buNone/>
+              <a:defRPr sz="6000" kern="1200">
+                <a:solidFill>
+                  <a:schemeClr val="tx1"/>
+                </a:solidFill>
+                <a:latin typeface="+mj-lt"/>
+                <a:ea typeface="+mj-ea"/>
+                <a:cs typeface="+mj-cs"/>
+              </a:defRPr>
+            </a:lvl1pPr>
+          </a:lstStyle>
+          <a:p>
+            <a:r>
+              <a:rPr lang="en-US" sz="4400" dirty="0" err="1">
+                <a:latin typeface="Segoe UI Light" panose="020B0502040204020203" pitchFamily="34" charset="0"/>
+                <a:cs typeface="Segoe UI Light" panose="020B0502040204020203" pitchFamily="34" charset="0"/>
+              </a:rPr>
+              <a:t>OneToManyMap</a:t>
+            </a:r>
+            <a:endParaRPr lang="en-US" sz="4400" dirty="0">
+              <a:latin typeface="Segoe UI Light" panose="020B0502040204020203" pitchFamily="34" charset="0"/>
+              <a:cs typeface="Segoe UI Light" panose="020B0502040204020203" pitchFamily="34" charset="0"/>
+            </a:endParaRPr>
+          </a:p>
+        </p:txBody>
+      </p:sp>
+      <p:sp>
+        <p:nvSpPr>
+          <p:cNvPr id="54" name="TextBox 53">
+            <a:extLst>
+              <a:ext uri="{FF2B5EF4-FFF2-40B4-BE49-F238E27FC236}">
+                <a16:creationId xmlns:a16="http://schemas.microsoft.com/office/drawing/2014/main" id="{8449D154-22FB-407D-AD28-8815ABE51DFA}"/>
+              </a:ext>
+            </a:extLst>
+          </p:cNvPr>
+          <p:cNvSpPr txBox="1"/>
+          <p:nvPr/>
+        </p:nvSpPr>
+        <p:spPr>
+          <a:xfrm>
+            <a:off x="1131516" y="1907593"/>
+            <a:ext cx="9893993" cy="4524315"/>
+          </a:xfrm>
+          <a:prstGeom prst="rect">
+            <a:avLst/>
+          </a:prstGeom>
+          <a:noFill/>
+        </p:spPr>
+        <p:txBody>
+          <a:bodyPr wrap="square" rtlCol="0">
+            <a:spAutoFit/>
+          </a:bodyPr>
+          <a:lstStyle/>
+          <a:p>
+            <a:pPr marL="285750" indent="-285750">
+              <a:buFont typeface="Arial" panose="020B0604020202020204" pitchFamily="34" charset="0"/>
+              <a:buChar char="•"/>
+            </a:pPr>
+            <a:r>
+              <a:rPr lang="en-US" sz="2000" dirty="0">
+                <a:latin typeface="Segoe UI Light" panose="020B0502040204020203" pitchFamily="34" charset="0"/>
+                <a:cs typeface="Segoe UI Light" panose="020B0502040204020203" pitchFamily="34" charset="0"/>
+              </a:rPr>
+              <a:t>Keys are unique</a:t>
+            </a:r>
+          </a:p>
+          <a:p>
+            <a:pPr marL="285750" indent="-285750">
+              <a:buFont typeface="Arial" panose="020B0604020202020204" pitchFamily="34" charset="0"/>
+              <a:buChar char="•"/>
+            </a:pPr>
+            <a:r>
+              <a:rPr lang="en-US" sz="2000" dirty="0">
+                <a:latin typeface="Segoe UI Light" panose="020B0502040204020203" pitchFamily="34" charset="0"/>
+                <a:cs typeface="Segoe UI Light" panose="020B0502040204020203" pitchFamily="34" charset="0"/>
+              </a:rPr>
+              <a:t>Values are unique</a:t>
+            </a:r>
+          </a:p>
+          <a:p>
+            <a:pPr marL="285750" indent="-285750">
+              <a:buFont typeface="Arial" panose="020B0604020202020204" pitchFamily="34" charset="0"/>
+              <a:buChar char="•"/>
+            </a:pPr>
+            <a:r>
+              <a:rPr lang="en-US" sz="2000" dirty="0">
+                <a:latin typeface="Segoe UI Light" panose="020B0502040204020203" pitchFamily="34" charset="0"/>
+                <a:cs typeface="Segoe UI Light" panose="020B0502040204020203" pitchFamily="34" charset="0"/>
+              </a:rPr>
+              <a:t>A Key can have multiple values associated to it</a:t>
+            </a:r>
+          </a:p>
+          <a:p>
+            <a:pPr marL="285750" indent="-285750">
+              <a:buFont typeface="Arial" panose="020B0604020202020204" pitchFamily="34" charset="0"/>
+              <a:buChar char="•"/>
+            </a:pPr>
+            <a:r>
+              <a:rPr lang="en-US" sz="2000" dirty="0">
+                <a:latin typeface="Segoe UI Light" panose="020B0502040204020203" pitchFamily="34" charset="0"/>
+                <a:cs typeface="Segoe UI Light" panose="020B0502040204020203" pitchFamily="34" charset="0"/>
+              </a:rPr>
+              <a:t>A Value can be associated to exactly one Key</a:t>
+            </a:r>
+          </a:p>
+          <a:p>
+            <a:pPr marL="285750" indent="-285750">
+              <a:buFont typeface="Arial" panose="020B0604020202020204" pitchFamily="34" charset="0"/>
+              <a:buChar char="•"/>
+            </a:pPr>
+            <a:r>
+              <a:rPr lang="en-US" sz="2000" dirty="0">
+                <a:latin typeface="Segoe UI Light" panose="020B0502040204020203" pitchFamily="34" charset="0"/>
+                <a:cs typeface="Segoe UI Light" panose="020B0502040204020203" pitchFamily="34" charset="0"/>
+              </a:rPr>
+              <a:t>Given a Value that has been associated to a Key, should return the Key</a:t>
+            </a:r>
+          </a:p>
+          <a:p>
+            <a:pPr marL="742950" lvl="1" indent="-285750">
+              <a:buFont typeface="Arial" panose="020B0604020202020204" pitchFamily="34" charset="0"/>
+              <a:buChar char="•"/>
+            </a:pPr>
+            <a:r>
+              <a:rPr lang="en-US" sz="2000" dirty="0">
+                <a:latin typeface="Segoe UI Light" panose="020B0502040204020203" pitchFamily="34" charset="0"/>
+                <a:cs typeface="Segoe UI Light" panose="020B0502040204020203" pitchFamily="34" charset="0"/>
+              </a:rPr>
+              <a:t>Otherwise throw a </a:t>
+            </a:r>
+            <a:r>
+              <a:rPr lang="en-US" sz="2000" dirty="0" err="1">
+                <a:latin typeface="Fira Code Retina" panose="020B0809050000020004" pitchFamily="49" charset="0"/>
+                <a:ea typeface="Fira Code Retina" panose="020B0809050000020004" pitchFamily="49" charset="0"/>
+                <a:cs typeface="Fira Code Retina" panose="020B0809050000020004" pitchFamily="49" charset="0"/>
+              </a:rPr>
+              <a:t>ValueNotMappedToKeyException</a:t>
+            </a:r>
+            <a:r>
+              <a:rPr lang="en-US" sz="2000" dirty="0">
+                <a:latin typeface="Segoe UI Light" panose="020B0502040204020203" pitchFamily="34" charset="0"/>
+                <a:cs typeface="Segoe UI Light" panose="020B0502040204020203" pitchFamily="34" charset="0"/>
+              </a:rPr>
+              <a:t> exception</a:t>
+            </a:r>
+          </a:p>
+          <a:p>
+            <a:pPr marL="285750" indent="-285750">
+              <a:buFont typeface="Arial" panose="020B0604020202020204" pitchFamily="34" charset="0"/>
+              <a:buChar char="•"/>
+            </a:pPr>
+            <a:r>
+              <a:rPr lang="en-US" sz="2000" dirty="0">
+                <a:latin typeface="Segoe UI Light" panose="020B0502040204020203" pitchFamily="34" charset="0"/>
+                <a:cs typeface="Segoe UI Light" panose="020B0502040204020203" pitchFamily="34" charset="0"/>
+              </a:rPr>
+              <a:t>Should allow associating a new Value to a pre-existing Key</a:t>
+            </a:r>
+          </a:p>
+          <a:p>
+            <a:pPr marL="285750" indent="-285750">
+              <a:buFont typeface="Arial" panose="020B0604020202020204" pitchFamily="34" charset="0"/>
+              <a:buChar char="•"/>
+            </a:pPr>
+            <a:r>
+              <a:rPr lang="en-US" sz="2000" dirty="0">
+                <a:latin typeface="Segoe UI Light" panose="020B0502040204020203" pitchFamily="34" charset="0"/>
+                <a:cs typeface="Segoe UI Light" panose="020B0502040204020203" pitchFamily="34" charset="0"/>
+              </a:rPr>
+              <a:t>Associating a Value that has previously been associated to another Key should throw </a:t>
+            </a:r>
+            <a:r>
+              <a:rPr lang="en-US" sz="2000" dirty="0" err="1">
+                <a:latin typeface="Fira Code Retina" panose="020B0809050000020004" pitchFamily="49" charset="0"/>
+                <a:ea typeface="Fira Code Retina" panose="020B0809050000020004" pitchFamily="49" charset="0"/>
+                <a:cs typeface="Fira Code Retina" panose="020B0809050000020004" pitchFamily="49" charset="0"/>
+              </a:rPr>
+              <a:t>ValuesHasPriorMappingToKeyException</a:t>
+            </a:r>
+            <a:r>
+              <a:rPr lang="en-US" sz="2000" dirty="0">
+                <a:latin typeface="Segoe UI Light" panose="020B0502040204020203" pitchFamily="34" charset="0"/>
+                <a:cs typeface="Segoe UI Light" panose="020B0502040204020203" pitchFamily="34" charset="0"/>
+              </a:rPr>
+              <a:t> exception</a:t>
+            </a:r>
+          </a:p>
+          <a:p>
+            <a:pPr marL="285750" indent="-285750">
+              <a:buFont typeface="Arial" panose="020B0604020202020204" pitchFamily="34" charset="0"/>
+              <a:buChar char="•"/>
+            </a:pPr>
+            <a:r>
+              <a:rPr lang="en-US" sz="2000" dirty="0">
+                <a:latin typeface="Segoe UI Light" panose="020B0502040204020203" pitchFamily="34" charset="0"/>
+                <a:cs typeface="Segoe UI Light" panose="020B0502040204020203" pitchFamily="34" charset="0"/>
+              </a:rPr>
+              <a:t>When one or more Values have been Associated to a pre-existing Key then associations should remain unchanged and throws </a:t>
+            </a:r>
+            <a:r>
+              <a:rPr lang="en-US" sz="2000" dirty="0" err="1">
+                <a:latin typeface="Fira Code Retina" panose="020B0809050000020004" pitchFamily="49" charset="0"/>
+                <a:ea typeface="Fira Code Retina" panose="020B0809050000020004" pitchFamily="49" charset="0"/>
+                <a:cs typeface="Fira Code Retina" panose="020B0809050000020004" pitchFamily="49" charset="0"/>
+              </a:rPr>
+              <a:t>ValuesHasPriorMappingToKeyException</a:t>
+            </a:r>
+            <a:r>
+              <a:rPr lang="en-US" sz="2000" dirty="0">
+                <a:latin typeface="Segoe UI Light" panose="020B0502040204020203" pitchFamily="34" charset="0"/>
+                <a:cs typeface="Segoe UI Light" panose="020B0502040204020203" pitchFamily="34" charset="0"/>
+              </a:rPr>
+              <a:t> exception</a:t>
+            </a:r>
+          </a:p>
+          <a:p>
+            <a:pPr marL="285750" indent="-285750">
+              <a:buFont typeface="Arial" panose="020B0604020202020204" pitchFamily="34" charset="0"/>
+              <a:buChar char="•"/>
+            </a:pPr>
+            <a:endParaRPr lang="en-US" sz="2400" dirty="0">
+              <a:latin typeface="Segoe UI Light" panose="020B0502040204020203" pitchFamily="34" charset="0"/>
+              <a:cs typeface="Segoe UI Light" panose="020B0502040204020203" pitchFamily="34" charset="0"/>
+            </a:endParaRPr>
+          </a:p>
+          <a:p>
+            <a:pPr marL="285750" indent="-285750">
+              <a:buFont typeface="Arial" panose="020B0604020202020204" pitchFamily="34" charset="0"/>
+              <a:buChar char="•"/>
+            </a:pPr>
+            <a:endParaRPr lang="en-US" sz="2400" dirty="0">
+              <a:latin typeface="Segoe UI Light" panose="020B0502040204020203" pitchFamily="34" charset="0"/>
+              <a:cs typeface="Segoe UI Light" panose="020B0502040204020203" pitchFamily="34" charset="0"/>
+            </a:endParaRPr>
+          </a:p>
+        </p:txBody>
+      </p:sp>
+    </p:spTree>
+    <p:extLst>
+      <p:ext uri="{BB962C8B-B14F-4D97-AF65-F5344CB8AC3E}">
+        <p14:creationId xmlns:p14="http://schemas.microsoft.com/office/powerpoint/2010/main" val="256555044"/>
+      </p:ext>
+    </p:extLst>
+  </p:cSld>
+  <p:clrMapOvr>
+    <a:masterClrMapping/>
+  </p:clrMapOvr>
+</p:sld>
+</file>
+
+<file path=ppt/slides/slide8.xml><?xml version="1.0" encoding="utf-8"?>
+<p:sld xmlns:a="http://schemas.openxmlformats.org/drawingml/2006/main" xmlns:r="http://schemas.openxmlformats.org/officeDocument/2006/relationships" xmlns:p="http://schemas.openxmlformats.org/presentationml/2006/main">
+  <p:cSld>
+    <p:spTree>
+      <p:nvGrpSpPr>
+        <p:cNvPr id="1" name=""/>
+        <p:cNvGrpSpPr/>
+        <p:nvPr/>
+      </p:nvGrpSpPr>
+      <p:grpSpPr>
+        <a:xfrm>
+          <a:off x="0" y="0"/>
+          <a:ext cx="0" cy="0"/>
+          <a:chOff x="0" y="0"/>
+          <a:chExt cx="0" cy="0"/>
+        </a:xfrm>
+      </p:grpSpPr>
+      <p:sp>
+        <p:nvSpPr>
+          <p:cNvPr id="2" name="Title 1">
+            <a:extLst>
+              <a:ext uri="{FF2B5EF4-FFF2-40B4-BE49-F238E27FC236}">
+                <a16:creationId xmlns:a16="http://schemas.microsoft.com/office/drawing/2014/main" id="{7AE9DA6F-CEDE-4D14-9604-ADFA660EAFB3}"/>
+              </a:ext>
+            </a:extLst>
+          </p:cNvPr>
+          <p:cNvSpPr>
+            <a:spLocks noGrp="1"/>
+          </p:cNvSpPr>
+          <p:nvPr>
+            <p:ph type="ctrTitle"/>
+          </p:nvPr>
+        </p:nvSpPr>
+        <p:spPr>
+          <a:xfrm>
+            <a:off x="1506513" y="22019"/>
+            <a:ext cx="9144000" cy="1086374"/>
+          </a:xfrm>
+        </p:spPr>
+        <p:txBody>
+          <a:bodyPr>
+            <a:normAutofit/>
+          </a:bodyPr>
+          <a:lstStyle/>
+          <a:p>
+            <a:r>
+              <a:rPr lang="en-US" dirty="0">
+                <a:latin typeface="Segoe UI Light" panose="020B0502040204020203" pitchFamily="34" charset="0"/>
+                <a:cs typeface="Segoe UI Light" panose="020B0502040204020203" pitchFamily="34" charset="0"/>
+              </a:rPr>
+              <a:t>Data Structures</a:t>
+            </a:r>
+          </a:p>
+        </p:txBody>
+      </p:sp>
+      <p:sp>
+        <p:nvSpPr>
+          <p:cNvPr id="4" name="Footer Placeholder 3">
+            <a:extLst>
+              <a:ext uri="{FF2B5EF4-FFF2-40B4-BE49-F238E27FC236}">
+                <a16:creationId xmlns:a16="http://schemas.microsoft.com/office/drawing/2014/main" id="{CD58CCA0-B819-401E-8411-15D72948A673}"/>
+              </a:ext>
+            </a:extLst>
+          </p:cNvPr>
+          <p:cNvSpPr>
+            <a:spLocks noGrp="1"/>
+          </p:cNvSpPr>
+          <p:nvPr>
+            <p:ph type="ftr" sz="quarter" idx="11"/>
+          </p:nvPr>
+        </p:nvSpPr>
+        <p:spPr>
+          <a:xfrm>
+            <a:off x="2778641" y="6492446"/>
+            <a:ext cx="6629400" cy="365125"/>
+          </a:xfrm>
+        </p:spPr>
+        <p:txBody>
+          <a:bodyPr/>
+          <a:lstStyle/>
+          <a:p>
+            <a:r>
+              <a:rPr lang="pt-BR" sz="1400" b="1" dirty="0">
+                <a:latin typeface="Segoe UI Light" panose="020B0502040204020203" pitchFamily="34" charset="0"/>
+                <a:cs typeface="Segoe UI Light" panose="020B0502040204020203" pitchFamily="34" charset="0"/>
+              </a:rPr>
+              <a:t>Blog</a:t>
+            </a:r>
+            <a:r>
+              <a:rPr lang="pt-BR" sz="1400" dirty="0">
+                <a:latin typeface="Segoe UI Light" panose="020B0502040204020203" pitchFamily="34" charset="0"/>
+                <a:cs typeface="Segoe UI Light" panose="020B0502040204020203" pitchFamily="34" charset="0"/>
+              </a:rPr>
+              <a:t>: http://www.matlus.com       </a:t>
+            </a:r>
+            <a:r>
+              <a:rPr lang="pt-BR" sz="1400" b="1" dirty="0">
+                <a:latin typeface="Segoe UI Light" panose="020B0502040204020203" pitchFamily="34" charset="0"/>
+                <a:cs typeface="Segoe UI Light" panose="020B0502040204020203" pitchFamily="34" charset="0"/>
+              </a:rPr>
+              <a:t>YouTube</a:t>
+            </a:r>
+            <a:r>
+              <a:rPr lang="pt-BR" sz="1400" dirty="0">
+                <a:latin typeface="Segoe UI Light" panose="020B0502040204020203" pitchFamily="34" charset="0"/>
+                <a:cs typeface="Segoe UI Light" panose="020B0502040204020203" pitchFamily="34" charset="0"/>
+              </a:rPr>
+              <a:t>: https://youtube.com/matlus</a:t>
+            </a:r>
+            <a:endParaRPr lang="en-US" sz="1400" dirty="0">
+              <a:latin typeface="Segoe UI Light" panose="020B0502040204020203" pitchFamily="34" charset="0"/>
+              <a:cs typeface="Segoe UI Light" panose="020B0502040204020203" pitchFamily="34" charset="0"/>
+            </a:endParaRPr>
+          </a:p>
+        </p:txBody>
+      </p:sp>
+      <p:sp>
+        <p:nvSpPr>
+          <p:cNvPr id="5" name="Title 1">
+            <a:extLst>
+              <a:ext uri="{FF2B5EF4-FFF2-40B4-BE49-F238E27FC236}">
+                <a16:creationId xmlns:a16="http://schemas.microsoft.com/office/drawing/2014/main" id="{2B8725F8-751C-4B8D-9BAD-6A2858BC8A5D}"/>
+              </a:ext>
+            </a:extLst>
+          </p:cNvPr>
+          <p:cNvSpPr txBox="1">
+            <a:spLocks/>
+          </p:cNvSpPr>
+          <p:nvPr/>
+        </p:nvSpPr>
+        <p:spPr>
+          <a:xfrm>
+            <a:off x="4376944" y="1093105"/>
+            <a:ext cx="3445788" cy="647711"/>
+          </a:xfrm>
+          <a:prstGeom prst="rect">
+            <a:avLst/>
+          </a:prstGeom>
+        </p:spPr>
+        <p:txBody>
+          <a:bodyPr vert="horz" lIns="91440" tIns="45720" rIns="91440" bIns="45720" rtlCol="0" anchor="b">
+            <a:normAutofit fontScale="85000" lnSpcReduction="10000"/>
+          </a:bodyPr>
+          <a:lstStyle>
+            <a:lvl1pPr algn="ctr" defTabSz="914400" rtl="0" eaLnBrk="1" latinLnBrk="0" hangingPunct="1">
+              <a:lnSpc>
+                <a:spcPct val="90000"/>
+              </a:lnSpc>
+              <a:spcBef>
+                <a:spcPct val="0"/>
+              </a:spcBef>
+              <a:buNone/>
+              <a:defRPr sz="6000" kern="1200">
+                <a:solidFill>
+                  <a:schemeClr val="tx1"/>
+                </a:solidFill>
+                <a:latin typeface="+mj-lt"/>
+                <a:ea typeface="+mj-ea"/>
+                <a:cs typeface="+mj-cs"/>
+              </a:defRPr>
+            </a:lvl1pPr>
+          </a:lstStyle>
+          <a:p>
+            <a:r>
+              <a:rPr lang="en-US" sz="4400" dirty="0" err="1">
+                <a:latin typeface="Segoe UI Light" panose="020B0502040204020203" pitchFamily="34" charset="0"/>
+                <a:cs typeface="Segoe UI Light" panose="020B0502040204020203" pitchFamily="34" charset="0"/>
+              </a:rPr>
+              <a:t>OneToManyMap</a:t>
+            </a:r>
+            <a:endParaRPr lang="en-US" sz="4400" dirty="0">
+              <a:latin typeface="Segoe UI Light" panose="020B0502040204020203" pitchFamily="34" charset="0"/>
+              <a:cs typeface="Segoe UI Light" panose="020B0502040204020203" pitchFamily="34" charset="0"/>
+            </a:endParaRPr>
+          </a:p>
+        </p:txBody>
+      </p:sp>
+      <p:sp>
+        <p:nvSpPr>
+          <p:cNvPr id="3" name="Rectangle 2">
+            <a:extLst>
+              <a:ext uri="{FF2B5EF4-FFF2-40B4-BE49-F238E27FC236}">
+                <a16:creationId xmlns:a16="http://schemas.microsoft.com/office/drawing/2014/main" id="{EE41E650-6AB9-4C5D-9874-87F2FAEE75E5}"/>
+              </a:ext>
+            </a:extLst>
+          </p:cNvPr>
+          <p:cNvSpPr/>
+          <p:nvPr/>
+        </p:nvSpPr>
+        <p:spPr>
+          <a:xfrm>
+            <a:off x="1015068" y="2424419"/>
+            <a:ext cx="2004969" cy="939150"/>
+          </a:xfrm>
+          <a:prstGeom prst="rect">
+            <a:avLst/>
+          </a:prstGeom>
+        </p:spPr>
+        <p:style>
+          <a:lnRef idx="2">
+            <a:schemeClr val="accent2">
+              <a:shade val="50000"/>
+            </a:schemeClr>
+          </a:lnRef>
+          <a:fillRef idx="1">
+            <a:schemeClr val="accent2"/>
+          </a:fillRef>
+          <a:effectRef idx="0">
+            <a:schemeClr val="accent2"/>
+          </a:effectRef>
+          <a:fontRef idx="minor">
+            <a:schemeClr val="lt1"/>
+          </a:fontRef>
+        </p:style>
+        <p:txBody>
+          <a:bodyPr rtlCol="0" anchor="ctr"/>
+          <a:lstStyle/>
+          <a:p>
+            <a:pPr algn="ctr"/>
+            <a:endParaRPr lang="en-US" dirty="0"/>
+          </a:p>
+        </p:txBody>
+      </p:sp>
+      <p:sp>
+        <p:nvSpPr>
+          <p:cNvPr id="10" name="Rectangle 9">
+            <a:extLst>
+              <a:ext uri="{FF2B5EF4-FFF2-40B4-BE49-F238E27FC236}">
+                <a16:creationId xmlns:a16="http://schemas.microsoft.com/office/drawing/2014/main" id="{257CD1A8-5DA9-4095-BB83-2F334F4EF8EB}"/>
+              </a:ext>
+            </a:extLst>
+          </p:cNvPr>
+          <p:cNvSpPr/>
+          <p:nvPr/>
+        </p:nvSpPr>
+        <p:spPr>
+          <a:xfrm>
+            <a:off x="1015068" y="2055303"/>
+            <a:ext cx="2004969" cy="369115"/>
+          </a:xfrm>
+          <a:prstGeom prst="rect">
+            <a:avLst/>
+          </a:prstGeom>
+        </p:spPr>
+        <p:style>
+          <a:lnRef idx="2">
+            <a:schemeClr val="accent3">
+              <a:shade val="50000"/>
+            </a:schemeClr>
+          </a:lnRef>
+          <a:fillRef idx="1">
+            <a:schemeClr val="accent3"/>
+          </a:fillRef>
+          <a:effectRef idx="0">
+            <a:schemeClr val="accent3"/>
+          </a:effectRef>
+          <a:fontRef idx="minor">
+            <a:schemeClr val="lt1"/>
+          </a:fontRef>
+        </p:style>
+        <p:txBody>
+          <a:bodyPr rtlCol="0" anchor="ctr"/>
+          <a:lstStyle/>
+          <a:p>
+            <a:pPr algn="ctr"/>
+            <a:r>
+              <a:rPr lang="en-US" dirty="0">
+                <a:latin typeface="Segoe UI Light" panose="020B0502040204020203" pitchFamily="34" charset="0"/>
+                <a:cs typeface="Segoe UI Light" panose="020B0502040204020203" pitchFamily="34" charset="0"/>
+              </a:rPr>
+              <a:t>Message</a:t>
+            </a:r>
+          </a:p>
+        </p:txBody>
+      </p:sp>
+      <p:sp>
+        <p:nvSpPr>
+          <p:cNvPr id="33" name="Rectangle 32">
+            <a:extLst>
+              <a:ext uri="{FF2B5EF4-FFF2-40B4-BE49-F238E27FC236}">
+                <a16:creationId xmlns:a16="http://schemas.microsoft.com/office/drawing/2014/main" id="{CE7F108A-EB80-4F6A-9E1E-B0D59587049D}"/>
+              </a:ext>
+            </a:extLst>
+          </p:cNvPr>
+          <p:cNvSpPr/>
+          <p:nvPr/>
+        </p:nvSpPr>
+        <p:spPr>
+          <a:xfrm>
+            <a:off x="1057013" y="2495409"/>
+            <a:ext cx="1912690" cy="369115"/>
+          </a:xfrm>
+          <a:prstGeom prst="rect">
+            <a:avLst/>
+          </a:prstGeom>
+        </p:spPr>
+        <p:style>
+          <a:lnRef idx="2">
+            <a:schemeClr val="accent4">
+              <a:shade val="50000"/>
+            </a:schemeClr>
+          </a:lnRef>
+          <a:fillRef idx="1">
+            <a:schemeClr val="accent4"/>
+          </a:fillRef>
+          <a:effectRef idx="0">
+            <a:schemeClr val="accent4"/>
+          </a:effectRef>
+          <a:fontRef idx="minor">
+            <a:schemeClr val="lt1"/>
+          </a:fontRef>
+        </p:style>
+        <p:txBody>
+          <a:bodyPr rtlCol="0" anchor="t"/>
+          <a:lstStyle/>
+          <a:p>
+            <a:pPr algn="just"/>
+            <a:r>
+              <a:rPr lang="en-US" dirty="0">
+                <a:latin typeface="Segoe UI Light" panose="020B0502040204020203" pitchFamily="34" charset="0"/>
+                <a:cs typeface="Segoe UI Light" panose="020B0502040204020203" pitchFamily="34" charset="0"/>
+              </a:rPr>
+              <a:t>Id</a:t>
+            </a:r>
+          </a:p>
+        </p:txBody>
+      </p:sp>
+      <p:pic>
+        <p:nvPicPr>
+          <p:cNvPr id="14" name="Picture 13">
+            <a:extLst>
+              <a:ext uri="{FF2B5EF4-FFF2-40B4-BE49-F238E27FC236}">
+                <a16:creationId xmlns:a16="http://schemas.microsoft.com/office/drawing/2014/main" id="{C65A48A3-61C9-4C3D-B3E9-E28720F234D5}"/>
+              </a:ext>
+            </a:extLst>
+          </p:cNvPr>
+          <p:cNvPicPr>
+            <a:picLocks noChangeAspect="1"/>
+          </p:cNvPicPr>
+          <p:nvPr/>
+        </p:nvPicPr>
+        <p:blipFill>
+          <a:blip r:embed="rId2">
+            <a:extLst>
+              <a:ext uri="{28A0092B-C50C-407E-A947-70E740481C1C}">
+                <a14:useLocalDpi xmlns:a14="http://schemas.microsoft.com/office/drawing/2010/main" val="0"/>
+              </a:ext>
+            </a:extLst>
+          </a:blip>
+          <a:stretch>
+            <a:fillRect/>
+          </a:stretch>
+        </p:blipFill>
+        <p:spPr>
+          <a:xfrm>
+            <a:off x="2569480" y="2495409"/>
+            <a:ext cx="369114" cy="369114"/>
+          </a:xfrm>
+          <a:prstGeom prst="rect">
+            <a:avLst/>
+          </a:prstGeom>
+        </p:spPr>
+      </p:pic>
+      <p:sp>
+        <p:nvSpPr>
+          <p:cNvPr id="36" name="Rectangle 35">
+            <a:extLst>
+              <a:ext uri="{FF2B5EF4-FFF2-40B4-BE49-F238E27FC236}">
+                <a16:creationId xmlns:a16="http://schemas.microsoft.com/office/drawing/2014/main" id="{99C206B6-6AD8-4CCB-B5F5-533411177A4F}"/>
+              </a:ext>
+            </a:extLst>
+          </p:cNvPr>
+          <p:cNvSpPr/>
+          <p:nvPr/>
+        </p:nvSpPr>
+        <p:spPr>
+          <a:xfrm>
+            <a:off x="1057013" y="2914857"/>
+            <a:ext cx="1912690" cy="369115"/>
+          </a:xfrm>
+          <a:prstGeom prst="rect">
+            <a:avLst/>
+          </a:prstGeom>
+        </p:spPr>
+        <p:style>
+          <a:lnRef idx="2">
+            <a:schemeClr val="accent4">
+              <a:shade val="50000"/>
+            </a:schemeClr>
+          </a:lnRef>
+          <a:fillRef idx="1">
+            <a:schemeClr val="accent4"/>
+          </a:fillRef>
+          <a:effectRef idx="0">
+            <a:schemeClr val="accent4"/>
+          </a:effectRef>
+          <a:fontRef idx="minor">
+            <a:schemeClr val="lt1"/>
+          </a:fontRef>
+        </p:style>
+        <p:txBody>
+          <a:bodyPr rtlCol="0" anchor="t"/>
+          <a:lstStyle/>
+          <a:p>
+            <a:pPr algn="just"/>
+            <a:r>
+              <a:rPr lang="en-US" dirty="0">
+                <a:latin typeface="Segoe UI Light" panose="020B0502040204020203" pitchFamily="34" charset="0"/>
+                <a:cs typeface="Segoe UI Light" panose="020B0502040204020203" pitchFamily="34" charset="0"/>
+              </a:rPr>
+              <a:t>Description</a:t>
+            </a:r>
+          </a:p>
+        </p:txBody>
+      </p:sp>
+      <p:sp>
+        <p:nvSpPr>
+          <p:cNvPr id="45" name="Rectangle 44">
+            <a:extLst>
+              <a:ext uri="{FF2B5EF4-FFF2-40B4-BE49-F238E27FC236}">
+                <a16:creationId xmlns:a16="http://schemas.microsoft.com/office/drawing/2014/main" id="{6CBEE1F5-A5E6-4F8E-8AE5-C64FCD8A4E36}"/>
+              </a:ext>
+            </a:extLst>
+          </p:cNvPr>
+          <p:cNvSpPr/>
+          <p:nvPr/>
+        </p:nvSpPr>
+        <p:spPr>
+          <a:xfrm>
+            <a:off x="5093515" y="3429001"/>
+            <a:ext cx="2004969" cy="1319068"/>
+          </a:xfrm>
+          <a:prstGeom prst="rect">
+            <a:avLst/>
+          </a:prstGeom>
+        </p:spPr>
+        <p:style>
+          <a:lnRef idx="2">
+            <a:schemeClr val="accent2">
+              <a:shade val="50000"/>
+            </a:schemeClr>
+          </a:lnRef>
+          <a:fillRef idx="1">
+            <a:schemeClr val="accent2"/>
+          </a:fillRef>
+          <a:effectRef idx="0">
+            <a:schemeClr val="accent2"/>
+          </a:effectRef>
+          <a:fontRef idx="minor">
+            <a:schemeClr val="lt1"/>
+          </a:fontRef>
+        </p:style>
+        <p:txBody>
+          <a:bodyPr rtlCol="0" anchor="ctr"/>
+          <a:lstStyle/>
+          <a:p>
+            <a:pPr algn="ctr"/>
+            <a:endParaRPr lang="en-US" dirty="0"/>
+          </a:p>
+        </p:txBody>
+      </p:sp>
+      <p:sp>
+        <p:nvSpPr>
+          <p:cNvPr id="46" name="Rectangle 45">
+            <a:extLst>
+              <a:ext uri="{FF2B5EF4-FFF2-40B4-BE49-F238E27FC236}">
+                <a16:creationId xmlns:a16="http://schemas.microsoft.com/office/drawing/2014/main" id="{0ADEF5AB-AE26-47A3-B3D8-49DC94CFA338}"/>
+              </a:ext>
+            </a:extLst>
+          </p:cNvPr>
+          <p:cNvSpPr/>
+          <p:nvPr/>
+        </p:nvSpPr>
+        <p:spPr>
+          <a:xfrm>
+            <a:off x="5093515" y="3059885"/>
+            <a:ext cx="2004969" cy="369115"/>
+          </a:xfrm>
+          <a:prstGeom prst="rect">
+            <a:avLst/>
+          </a:prstGeom>
+        </p:spPr>
+        <p:style>
+          <a:lnRef idx="2">
+            <a:schemeClr val="accent3">
+              <a:shade val="50000"/>
+            </a:schemeClr>
+          </a:lnRef>
+          <a:fillRef idx="1">
+            <a:schemeClr val="accent3"/>
+          </a:fillRef>
+          <a:effectRef idx="0">
+            <a:schemeClr val="accent3"/>
+          </a:effectRef>
+          <a:fontRef idx="minor">
+            <a:schemeClr val="lt1"/>
+          </a:fontRef>
+        </p:style>
+        <p:txBody>
+          <a:bodyPr rtlCol="0" anchor="ctr"/>
+          <a:lstStyle/>
+          <a:p>
+            <a:pPr algn="ctr"/>
+            <a:r>
+              <a:rPr lang="en-US" sz="1600" dirty="0" err="1">
+                <a:latin typeface="Segoe UI Light" panose="020B0502040204020203" pitchFamily="34" charset="0"/>
+                <a:cs typeface="Segoe UI Light" panose="020B0502040204020203" pitchFamily="34" charset="0"/>
+              </a:rPr>
+              <a:t>StateMessage</a:t>
+            </a:r>
+            <a:endParaRPr lang="en-US" sz="1600" dirty="0">
+              <a:latin typeface="Segoe UI Light" panose="020B0502040204020203" pitchFamily="34" charset="0"/>
+              <a:cs typeface="Segoe UI Light" panose="020B0502040204020203" pitchFamily="34" charset="0"/>
+            </a:endParaRPr>
+          </a:p>
+        </p:txBody>
+      </p:sp>
+      <p:sp>
+        <p:nvSpPr>
+          <p:cNvPr id="47" name="Rectangle 46">
+            <a:extLst>
+              <a:ext uri="{FF2B5EF4-FFF2-40B4-BE49-F238E27FC236}">
+                <a16:creationId xmlns:a16="http://schemas.microsoft.com/office/drawing/2014/main" id="{E3B3D67E-CDEB-4F3C-901D-937FF884FFB1}"/>
+              </a:ext>
+            </a:extLst>
+          </p:cNvPr>
+          <p:cNvSpPr/>
+          <p:nvPr/>
+        </p:nvSpPr>
+        <p:spPr>
+          <a:xfrm>
+            <a:off x="5135460" y="3499991"/>
+            <a:ext cx="1912690" cy="369115"/>
+          </a:xfrm>
+          <a:prstGeom prst="rect">
+            <a:avLst/>
+          </a:prstGeom>
+        </p:spPr>
+        <p:style>
+          <a:lnRef idx="2">
+            <a:schemeClr val="accent4">
+              <a:shade val="50000"/>
+            </a:schemeClr>
+          </a:lnRef>
+          <a:fillRef idx="1">
+            <a:schemeClr val="accent4"/>
+          </a:fillRef>
+          <a:effectRef idx="0">
+            <a:schemeClr val="accent4"/>
+          </a:effectRef>
+          <a:fontRef idx="minor">
+            <a:schemeClr val="lt1"/>
+          </a:fontRef>
+        </p:style>
+        <p:txBody>
+          <a:bodyPr rtlCol="0" anchor="t"/>
+          <a:lstStyle/>
+          <a:p>
+            <a:pPr algn="just"/>
+            <a:r>
+              <a:rPr lang="en-US" dirty="0">
+                <a:latin typeface="Segoe UI Light" panose="020B0502040204020203" pitchFamily="34" charset="0"/>
+                <a:cs typeface="Segoe UI Light" panose="020B0502040204020203" pitchFamily="34" charset="0"/>
+              </a:rPr>
+              <a:t>Id</a:t>
+            </a:r>
+          </a:p>
+        </p:txBody>
+      </p:sp>
+      <p:pic>
+        <p:nvPicPr>
+          <p:cNvPr id="48" name="Picture 47">
+            <a:extLst>
+              <a:ext uri="{FF2B5EF4-FFF2-40B4-BE49-F238E27FC236}">
+                <a16:creationId xmlns:a16="http://schemas.microsoft.com/office/drawing/2014/main" id="{0B908255-D285-4BFE-B1EC-9639B3D10739}"/>
+              </a:ext>
+            </a:extLst>
+          </p:cNvPr>
+          <p:cNvPicPr>
+            <a:picLocks noChangeAspect="1"/>
+          </p:cNvPicPr>
+          <p:nvPr/>
+        </p:nvPicPr>
+        <p:blipFill>
+          <a:blip r:embed="rId2">
+            <a:extLst>
+              <a:ext uri="{28A0092B-C50C-407E-A947-70E740481C1C}">
+                <a14:useLocalDpi xmlns:a14="http://schemas.microsoft.com/office/drawing/2010/main" val="0"/>
+              </a:ext>
+            </a:extLst>
+          </a:blip>
+          <a:stretch>
+            <a:fillRect/>
+          </a:stretch>
+        </p:blipFill>
+        <p:spPr>
+          <a:xfrm>
+            <a:off x="6647927" y="3499991"/>
+            <a:ext cx="369114" cy="369114"/>
+          </a:xfrm>
+          <a:prstGeom prst="rect">
+            <a:avLst/>
+          </a:prstGeom>
+        </p:spPr>
+      </p:pic>
+      <p:sp>
+        <p:nvSpPr>
+          <p:cNvPr id="49" name="Rectangle 48">
+            <a:extLst>
+              <a:ext uri="{FF2B5EF4-FFF2-40B4-BE49-F238E27FC236}">
+                <a16:creationId xmlns:a16="http://schemas.microsoft.com/office/drawing/2014/main" id="{BEF672A9-1384-4B10-9271-00517B761FFD}"/>
+              </a:ext>
+            </a:extLst>
+          </p:cNvPr>
+          <p:cNvSpPr/>
+          <p:nvPr/>
+        </p:nvSpPr>
+        <p:spPr>
+          <a:xfrm>
+            <a:off x="5135460" y="3919439"/>
+            <a:ext cx="1912690" cy="369115"/>
+          </a:xfrm>
+          <a:prstGeom prst="rect">
+            <a:avLst/>
+          </a:prstGeom>
+        </p:spPr>
+        <p:style>
+          <a:lnRef idx="2">
+            <a:schemeClr val="accent4">
+              <a:shade val="50000"/>
+            </a:schemeClr>
+          </a:lnRef>
+          <a:fillRef idx="1">
+            <a:schemeClr val="accent4"/>
+          </a:fillRef>
+          <a:effectRef idx="0">
+            <a:schemeClr val="accent4"/>
+          </a:effectRef>
+          <a:fontRef idx="minor">
+            <a:schemeClr val="lt1"/>
+          </a:fontRef>
+        </p:style>
+        <p:txBody>
+          <a:bodyPr rtlCol="0" anchor="t"/>
+          <a:lstStyle/>
+          <a:p>
+            <a:pPr algn="just"/>
+            <a:r>
+              <a:rPr lang="en-US" dirty="0" err="1">
+                <a:latin typeface="Segoe UI Light" panose="020B0502040204020203" pitchFamily="34" charset="0"/>
+                <a:cs typeface="Segoe UI Light" panose="020B0502040204020203" pitchFamily="34" charset="0"/>
+              </a:rPr>
+              <a:t>MessageId</a:t>
+            </a:r>
+            <a:endParaRPr lang="en-US" dirty="0">
+              <a:latin typeface="Segoe UI Light" panose="020B0502040204020203" pitchFamily="34" charset="0"/>
+              <a:cs typeface="Segoe UI Light" panose="020B0502040204020203" pitchFamily="34" charset="0"/>
+            </a:endParaRPr>
+          </a:p>
+        </p:txBody>
+      </p:sp>
+      <p:cxnSp>
+        <p:nvCxnSpPr>
+          <p:cNvPr id="17" name="Straight Arrow Connector 16">
+            <a:extLst>
+              <a:ext uri="{FF2B5EF4-FFF2-40B4-BE49-F238E27FC236}">
+                <a16:creationId xmlns:a16="http://schemas.microsoft.com/office/drawing/2014/main" id="{F7719176-6EBB-4905-B95D-BF9BE67B306E}"/>
+              </a:ext>
+            </a:extLst>
+          </p:cNvPr>
+          <p:cNvCxnSpPr>
+            <a:stCxn id="33" idx="3"/>
+            <a:endCxn id="47" idx="1"/>
+          </p:cNvCxnSpPr>
+          <p:nvPr/>
+        </p:nvCxnSpPr>
+        <p:spPr>
+          <a:xfrm>
+            <a:off x="2969703" y="2679967"/>
+            <a:ext cx="2165757" cy="1004582"/>
+          </a:xfrm>
+          <a:prstGeom prst="straightConnector1">
+            <a:avLst/>
+          </a:prstGeom>
+          <a:ln w="28575">
+            <a:tailEnd type="triangle"/>
+          </a:ln>
+        </p:spPr>
+        <p:style>
+          <a:lnRef idx="1">
+            <a:schemeClr val="dk1"/>
+          </a:lnRef>
+          <a:fillRef idx="0">
+            <a:schemeClr val="dk1"/>
+          </a:fillRef>
+          <a:effectRef idx="0">
+            <a:schemeClr val="dk1"/>
+          </a:effectRef>
+          <a:fontRef idx="minor">
+            <a:schemeClr val="tx1"/>
+          </a:fontRef>
+        </p:style>
+      </p:cxnSp>
+      <p:pic>
+        <p:nvPicPr>
+          <p:cNvPr id="24" name="Picture 23">
+            <a:extLst>
+              <a:ext uri="{FF2B5EF4-FFF2-40B4-BE49-F238E27FC236}">
+                <a16:creationId xmlns:a16="http://schemas.microsoft.com/office/drawing/2014/main" id="{A875E49C-65EF-40A5-9205-E9171A303DE3}"/>
+              </a:ext>
+            </a:extLst>
+          </p:cNvPr>
+          <p:cNvPicPr>
+            <a:picLocks noChangeAspect="1"/>
+          </p:cNvPicPr>
+          <p:nvPr/>
+        </p:nvPicPr>
+        <p:blipFill>
+          <a:blip r:embed="rId3">
+            <a:extLst>
+              <a:ext uri="{28A0092B-C50C-407E-A947-70E740481C1C}">
+                <a14:useLocalDpi xmlns:a14="http://schemas.microsoft.com/office/drawing/2010/main" val="0"/>
+              </a:ext>
+            </a:extLst>
+          </a:blip>
+          <a:stretch>
+            <a:fillRect/>
+          </a:stretch>
+        </p:blipFill>
+        <p:spPr>
+          <a:xfrm rot="5400000">
+            <a:off x="2591607" y="2936171"/>
+            <a:ext cx="327762" cy="327762"/>
+          </a:xfrm>
+          <a:prstGeom prst="rect">
+            <a:avLst/>
+          </a:prstGeom>
+        </p:spPr>
+      </p:pic>
+      <p:sp>
+        <p:nvSpPr>
+          <p:cNvPr id="26" name="Rectangle 25">
+            <a:extLst>
+              <a:ext uri="{FF2B5EF4-FFF2-40B4-BE49-F238E27FC236}">
+                <a16:creationId xmlns:a16="http://schemas.microsoft.com/office/drawing/2014/main" id="{C2531BFE-EF95-4833-9D84-713AE53F6F01}"/>
+              </a:ext>
+            </a:extLst>
+          </p:cNvPr>
+          <p:cNvSpPr/>
+          <p:nvPr/>
+        </p:nvSpPr>
+        <p:spPr>
+          <a:xfrm>
+            <a:off x="5135460" y="4328893"/>
+            <a:ext cx="1912690" cy="369115"/>
+          </a:xfrm>
+          <a:prstGeom prst="rect">
+            <a:avLst/>
+          </a:prstGeom>
+        </p:spPr>
+        <p:style>
+          <a:lnRef idx="2">
+            <a:schemeClr val="accent4">
+              <a:shade val="50000"/>
+            </a:schemeClr>
+          </a:lnRef>
+          <a:fillRef idx="1">
+            <a:schemeClr val="accent4"/>
+          </a:fillRef>
+          <a:effectRef idx="0">
+            <a:schemeClr val="accent4"/>
+          </a:effectRef>
+          <a:fontRef idx="minor">
+            <a:schemeClr val="lt1"/>
+          </a:fontRef>
+        </p:style>
+        <p:txBody>
+          <a:bodyPr rtlCol="0" anchor="t"/>
+          <a:lstStyle/>
+          <a:p>
+            <a:pPr algn="just"/>
+            <a:r>
+              <a:rPr lang="en-US" dirty="0">
+                <a:latin typeface="Segoe UI Light" panose="020B0502040204020203" pitchFamily="34" charset="0"/>
+                <a:cs typeface="Segoe UI Light" panose="020B0502040204020203" pitchFamily="34" charset="0"/>
+              </a:rPr>
+              <a:t>Acronym</a:t>
+            </a:r>
+          </a:p>
+        </p:txBody>
+      </p:sp>
+      <p:pic>
+        <p:nvPicPr>
+          <p:cNvPr id="27" name="Picture 26">
+            <a:extLst>
+              <a:ext uri="{FF2B5EF4-FFF2-40B4-BE49-F238E27FC236}">
+                <a16:creationId xmlns:a16="http://schemas.microsoft.com/office/drawing/2014/main" id="{2862D86C-69D5-4F4A-8847-A1CDF5F36A4D}"/>
+              </a:ext>
+            </a:extLst>
+          </p:cNvPr>
+          <p:cNvPicPr>
+            <a:picLocks noChangeAspect="1"/>
+          </p:cNvPicPr>
+          <p:nvPr/>
+        </p:nvPicPr>
+        <p:blipFill>
+          <a:blip r:embed="rId3">
+            <a:extLst>
+              <a:ext uri="{28A0092B-C50C-407E-A947-70E740481C1C}">
+                <a14:useLocalDpi xmlns:a14="http://schemas.microsoft.com/office/drawing/2010/main" val="0"/>
+              </a:ext>
+            </a:extLst>
+          </a:blip>
+          <a:stretch>
+            <a:fillRect/>
+          </a:stretch>
+        </p:blipFill>
+        <p:spPr>
+          <a:xfrm rot="5400000">
+            <a:off x="6668603" y="4349549"/>
+            <a:ext cx="327762" cy="327762"/>
+          </a:xfrm>
+          <a:prstGeom prst="rect">
+            <a:avLst/>
+          </a:prstGeom>
+        </p:spPr>
+      </p:pic>
+      <p:pic>
+        <p:nvPicPr>
+          <p:cNvPr id="1026" name="Picture 2" descr="SQL SERVER - 2005 - Find Tables With Foreign Key Constraint in Database keyicon ">
+            <a:extLst>
+              <a:ext uri="{FF2B5EF4-FFF2-40B4-BE49-F238E27FC236}">
+                <a16:creationId xmlns:a16="http://schemas.microsoft.com/office/drawing/2014/main" id="{DC7C2061-1B4F-4356-895F-D2EF4E7B7E90}"/>
+              </a:ext>
+            </a:extLst>
+          </p:cNvPr>
+          <p:cNvPicPr>
+            <a:picLocks noChangeAspect="1" noChangeArrowheads="1"/>
+          </p:cNvPicPr>
+          <p:nvPr/>
+        </p:nvPicPr>
+        <p:blipFill>
+          <a:blip r:embed="rId4">
+            <a:extLst>
+              <a:ext uri="{28A0092B-C50C-407E-A947-70E740481C1C}">
+                <a14:useLocalDpi xmlns:a14="http://schemas.microsoft.com/office/drawing/2010/main" val="0"/>
+              </a:ext>
+            </a:extLst>
+          </a:blip>
+          <a:srcRect/>
+          <a:stretch>
+            <a:fillRect/>
+          </a:stretch>
+        </p:blipFill>
+        <p:spPr bwMode="auto">
+          <a:xfrm>
+            <a:off x="6668603" y="3956179"/>
+            <a:ext cx="342723" cy="342723"/>
+          </a:xfrm>
+          <a:prstGeom prst="rect">
+            <a:avLst/>
+          </a:prstGeom>
+          <a:noFill/>
+          <a:extLst>
+            <a:ext uri="{909E8E84-426E-40DD-AFC4-6F175D3DCCD1}">
+              <a14:hiddenFill xmlns:a14="http://schemas.microsoft.com/office/drawing/2010/main">
+                <a:solidFill>
+                  <a:srgbClr val="FFFFFF"/>
+                </a:solidFill>
+              </a14:hiddenFill>
+            </a:ext>
+          </a:extLst>
+        </p:spPr>
+      </p:pic>
+    </p:spTree>
+    <p:extLst>
+      <p:ext uri="{BB962C8B-B14F-4D97-AF65-F5344CB8AC3E}">
+        <p14:creationId xmlns:p14="http://schemas.microsoft.com/office/powerpoint/2010/main" val="3190608356"/>
+      </p:ext>
+    </p:extLst>
+  </p:cSld>
+  <p:clrMapOvr>
+    <a:masterClrMapping/>
+  </p:clrMapOvr>
+</p:sld>
+</file>
+
+<file path=ppt/slides/slide9.xml><?xml version="1.0" encoding="utf-8"?>
+<p:sld xmlns:a="http://schemas.openxmlformats.org/drawingml/2006/main" xmlns:r="http://schemas.openxmlformats.org/officeDocument/2006/relationships" xmlns:p="http://schemas.openxmlformats.org/presentationml/2006/main">
+  <p:cSld>
+    <p:spTree>
+      <p:nvGrpSpPr>
+        <p:cNvPr id="1" name=""/>
+        <p:cNvGrpSpPr/>
+        <p:nvPr/>
+      </p:nvGrpSpPr>
+      <p:grpSpPr>
+        <a:xfrm>
+          <a:off x="0" y="0"/>
+          <a:ext cx="0" cy="0"/>
+          <a:chOff x="0" y="0"/>
+          <a:chExt cx="0" cy="0"/>
+        </a:xfrm>
+      </p:grpSpPr>
+      <p:sp>
+        <p:nvSpPr>
+          <p:cNvPr id="2" name="Title 1">
+            <a:extLst>
+              <a:ext uri="{FF2B5EF4-FFF2-40B4-BE49-F238E27FC236}">
+                <a16:creationId xmlns:a16="http://schemas.microsoft.com/office/drawing/2014/main" id="{7AE9DA6F-CEDE-4D14-9604-ADFA660EAFB3}"/>
+              </a:ext>
+            </a:extLst>
+          </p:cNvPr>
+          <p:cNvSpPr>
+            <a:spLocks noGrp="1"/>
+          </p:cNvSpPr>
+          <p:nvPr>
+            <p:ph type="ctrTitle"/>
+          </p:nvPr>
+        </p:nvSpPr>
+        <p:spPr>
+          <a:xfrm>
+            <a:off x="1506513" y="22019"/>
+            <a:ext cx="9144000" cy="1086374"/>
+          </a:xfrm>
+        </p:spPr>
+        <p:txBody>
+          <a:bodyPr>
+            <a:normAutofit/>
+          </a:bodyPr>
+          <a:lstStyle/>
+          <a:p>
+            <a:r>
+              <a:rPr lang="en-US" dirty="0">
+                <a:latin typeface="Segoe UI Light" panose="020B0502040204020203" pitchFamily="34" charset="0"/>
+                <a:cs typeface="Segoe UI Light" panose="020B0502040204020203" pitchFamily="34" charset="0"/>
+              </a:rPr>
+              <a:t>Data Structures</a:t>
+            </a:r>
+          </a:p>
+        </p:txBody>
+      </p:sp>
+      <p:sp>
+        <p:nvSpPr>
+          <p:cNvPr id="4" name="Footer Placeholder 3">
+            <a:extLst>
+              <a:ext uri="{FF2B5EF4-FFF2-40B4-BE49-F238E27FC236}">
+                <a16:creationId xmlns:a16="http://schemas.microsoft.com/office/drawing/2014/main" id="{CD58CCA0-B819-401E-8411-15D72948A673}"/>
+              </a:ext>
+            </a:extLst>
+          </p:cNvPr>
+          <p:cNvSpPr>
+            <a:spLocks noGrp="1"/>
+          </p:cNvSpPr>
+          <p:nvPr>
+            <p:ph type="ftr" sz="quarter" idx="11"/>
+          </p:nvPr>
+        </p:nvSpPr>
+        <p:spPr>
+          <a:xfrm>
+            <a:off x="2778641" y="6492446"/>
+            <a:ext cx="6629400" cy="365125"/>
+          </a:xfrm>
+        </p:spPr>
+        <p:txBody>
+          <a:bodyPr/>
+          <a:lstStyle/>
+          <a:p>
+            <a:r>
+              <a:rPr lang="pt-BR" sz="1400" b="1" dirty="0">
+                <a:latin typeface="Segoe UI Light" panose="020B0502040204020203" pitchFamily="34" charset="0"/>
+                <a:cs typeface="Segoe UI Light" panose="020B0502040204020203" pitchFamily="34" charset="0"/>
+              </a:rPr>
+              <a:t>Blog</a:t>
+            </a:r>
+            <a:r>
+              <a:rPr lang="pt-BR" sz="1400" dirty="0">
+                <a:latin typeface="Segoe UI Light" panose="020B0502040204020203" pitchFamily="34" charset="0"/>
+                <a:cs typeface="Segoe UI Light" panose="020B0502040204020203" pitchFamily="34" charset="0"/>
+              </a:rPr>
+              <a:t>: http://www.matlus.com       </a:t>
+            </a:r>
+            <a:r>
+              <a:rPr lang="pt-BR" sz="1400" b="1" dirty="0">
+                <a:latin typeface="Segoe UI Light" panose="020B0502040204020203" pitchFamily="34" charset="0"/>
+                <a:cs typeface="Segoe UI Light" panose="020B0502040204020203" pitchFamily="34" charset="0"/>
+              </a:rPr>
+              <a:t>YouTube</a:t>
+            </a:r>
+            <a:r>
+              <a:rPr lang="pt-BR" sz="1400" dirty="0">
+                <a:latin typeface="Segoe UI Light" panose="020B0502040204020203" pitchFamily="34" charset="0"/>
+                <a:cs typeface="Segoe UI Light" panose="020B0502040204020203" pitchFamily="34" charset="0"/>
+              </a:rPr>
+              <a:t>: https://youtube.com/matlus</a:t>
+            </a:r>
+            <a:endParaRPr lang="en-US" sz="1400" dirty="0">
+              <a:latin typeface="Segoe UI Light" panose="020B0502040204020203" pitchFamily="34" charset="0"/>
+              <a:cs typeface="Segoe UI Light" panose="020B0502040204020203" pitchFamily="34" charset="0"/>
+            </a:endParaRPr>
+          </a:p>
+        </p:txBody>
+      </p:sp>
+      <p:sp>
+        <p:nvSpPr>
+          <p:cNvPr id="5" name="Title 1">
+            <a:extLst>
+              <a:ext uri="{FF2B5EF4-FFF2-40B4-BE49-F238E27FC236}">
+                <a16:creationId xmlns:a16="http://schemas.microsoft.com/office/drawing/2014/main" id="{2B8725F8-751C-4B8D-9BAD-6A2858BC8A5D}"/>
+              </a:ext>
+            </a:extLst>
+          </p:cNvPr>
+          <p:cNvSpPr txBox="1">
+            <a:spLocks/>
+          </p:cNvSpPr>
+          <p:nvPr/>
+        </p:nvSpPr>
+        <p:spPr>
+          <a:xfrm>
+            <a:off x="4376944" y="1093105"/>
+            <a:ext cx="3445788" cy="647711"/>
+          </a:xfrm>
+          <a:prstGeom prst="rect">
+            <a:avLst/>
+          </a:prstGeom>
+        </p:spPr>
+        <p:txBody>
+          <a:bodyPr vert="horz" lIns="91440" tIns="45720" rIns="91440" bIns="45720" rtlCol="0" anchor="b">
+            <a:normAutofit fontScale="85000" lnSpcReduction="10000"/>
+          </a:bodyPr>
+          <a:lstStyle>
+            <a:lvl1pPr algn="ctr" defTabSz="914400" rtl="0" eaLnBrk="1" latinLnBrk="0" hangingPunct="1">
+              <a:lnSpc>
+                <a:spcPct val="90000"/>
+              </a:lnSpc>
+              <a:spcBef>
+                <a:spcPct val="0"/>
+              </a:spcBef>
+              <a:buNone/>
+              <a:defRPr sz="6000" kern="1200">
+                <a:solidFill>
+                  <a:schemeClr val="tx1"/>
+                </a:solidFill>
+                <a:latin typeface="+mj-lt"/>
+                <a:ea typeface="+mj-ea"/>
+                <a:cs typeface="+mj-cs"/>
+              </a:defRPr>
+            </a:lvl1pPr>
+          </a:lstStyle>
+          <a:p>
+            <a:r>
+              <a:rPr lang="en-US" sz="4400" dirty="0" err="1">
+                <a:latin typeface="Segoe UI Light" panose="020B0502040204020203" pitchFamily="34" charset="0"/>
+                <a:cs typeface="Segoe UI Light" panose="020B0502040204020203" pitchFamily="34" charset="0"/>
+              </a:rPr>
+              <a:t>OneToManyMap</a:t>
+            </a:r>
+            <a:endParaRPr lang="en-US" sz="4400" dirty="0">
+              <a:latin typeface="Segoe UI Light" panose="020B0502040204020203" pitchFamily="34" charset="0"/>
+              <a:cs typeface="Segoe UI Light" panose="020B0502040204020203" pitchFamily="34" charset="0"/>
+            </a:endParaRPr>
+          </a:p>
+        </p:txBody>
+      </p:sp>
+      <p:sp>
+        <p:nvSpPr>
+          <p:cNvPr id="3" name="Rectangle 2">
+            <a:extLst>
+              <a:ext uri="{FF2B5EF4-FFF2-40B4-BE49-F238E27FC236}">
+                <a16:creationId xmlns:a16="http://schemas.microsoft.com/office/drawing/2014/main" id="{EE41E650-6AB9-4C5D-9874-87F2FAEE75E5}"/>
+              </a:ext>
+            </a:extLst>
+          </p:cNvPr>
+          <p:cNvSpPr/>
+          <p:nvPr/>
+        </p:nvSpPr>
+        <p:spPr>
+          <a:xfrm>
+            <a:off x="1015068" y="2424419"/>
+            <a:ext cx="2004969" cy="939150"/>
+          </a:xfrm>
+          <a:prstGeom prst="rect">
+            <a:avLst/>
+          </a:prstGeom>
+        </p:spPr>
+        <p:style>
+          <a:lnRef idx="2">
+            <a:schemeClr val="accent2">
+              <a:shade val="50000"/>
+            </a:schemeClr>
+          </a:lnRef>
+          <a:fillRef idx="1">
+            <a:schemeClr val="accent2"/>
+          </a:fillRef>
+          <a:effectRef idx="0">
+            <a:schemeClr val="accent2"/>
+          </a:effectRef>
+          <a:fontRef idx="minor">
+            <a:schemeClr val="lt1"/>
+          </a:fontRef>
+        </p:style>
+        <p:txBody>
+          <a:bodyPr rtlCol="0" anchor="ctr"/>
+          <a:lstStyle/>
+          <a:p>
+            <a:pPr algn="ctr"/>
+            <a:endParaRPr lang="en-US" dirty="0"/>
+          </a:p>
+        </p:txBody>
+      </p:sp>
+      <p:sp>
+        <p:nvSpPr>
+          <p:cNvPr id="10" name="Rectangle 9">
+            <a:extLst>
+              <a:ext uri="{FF2B5EF4-FFF2-40B4-BE49-F238E27FC236}">
+                <a16:creationId xmlns:a16="http://schemas.microsoft.com/office/drawing/2014/main" id="{257CD1A8-5DA9-4095-BB83-2F334F4EF8EB}"/>
+              </a:ext>
+            </a:extLst>
+          </p:cNvPr>
+          <p:cNvSpPr/>
+          <p:nvPr/>
+        </p:nvSpPr>
+        <p:spPr>
+          <a:xfrm>
+            <a:off x="1015068" y="2055303"/>
+            <a:ext cx="2004969" cy="369115"/>
+          </a:xfrm>
+          <a:prstGeom prst="rect">
+            <a:avLst/>
+          </a:prstGeom>
+        </p:spPr>
+        <p:style>
+          <a:lnRef idx="2">
+            <a:schemeClr val="accent3">
+              <a:shade val="50000"/>
+            </a:schemeClr>
+          </a:lnRef>
+          <a:fillRef idx="1">
+            <a:schemeClr val="accent3"/>
+          </a:fillRef>
+          <a:effectRef idx="0">
+            <a:schemeClr val="accent3"/>
+          </a:effectRef>
+          <a:fontRef idx="minor">
+            <a:schemeClr val="lt1"/>
+          </a:fontRef>
+        </p:style>
+        <p:txBody>
+          <a:bodyPr rtlCol="0" anchor="ctr"/>
+          <a:lstStyle/>
+          <a:p>
+            <a:pPr algn="ctr"/>
+            <a:r>
+              <a:rPr lang="en-US" dirty="0">
+                <a:latin typeface="Segoe UI Light" panose="020B0502040204020203" pitchFamily="34" charset="0"/>
+                <a:cs typeface="Segoe UI Light" panose="020B0502040204020203" pitchFamily="34" charset="0"/>
+              </a:rPr>
+              <a:t>Message</a:t>
+            </a:r>
+          </a:p>
+        </p:txBody>
+      </p:sp>
+      <p:sp>
+        <p:nvSpPr>
+          <p:cNvPr id="33" name="Rectangle 32">
+            <a:extLst>
+              <a:ext uri="{FF2B5EF4-FFF2-40B4-BE49-F238E27FC236}">
+                <a16:creationId xmlns:a16="http://schemas.microsoft.com/office/drawing/2014/main" id="{CE7F108A-EB80-4F6A-9E1E-B0D59587049D}"/>
+              </a:ext>
+            </a:extLst>
+          </p:cNvPr>
+          <p:cNvSpPr/>
+          <p:nvPr/>
+        </p:nvSpPr>
+        <p:spPr>
+          <a:xfrm>
+            <a:off x="1057013" y="2495409"/>
+            <a:ext cx="1912690" cy="369115"/>
+          </a:xfrm>
+          <a:prstGeom prst="rect">
+            <a:avLst/>
+          </a:prstGeom>
+        </p:spPr>
+        <p:style>
+          <a:lnRef idx="2">
+            <a:schemeClr val="accent4">
+              <a:shade val="50000"/>
+            </a:schemeClr>
+          </a:lnRef>
+          <a:fillRef idx="1">
+            <a:schemeClr val="accent4"/>
+          </a:fillRef>
+          <a:effectRef idx="0">
+            <a:schemeClr val="accent4"/>
+          </a:effectRef>
+          <a:fontRef idx="minor">
+            <a:schemeClr val="lt1"/>
+          </a:fontRef>
+        </p:style>
+        <p:txBody>
+          <a:bodyPr rtlCol="0" anchor="t"/>
+          <a:lstStyle/>
+          <a:p>
+            <a:pPr algn="just"/>
+            <a:r>
+              <a:rPr lang="en-US" dirty="0">
+                <a:latin typeface="Segoe UI Light" panose="020B0502040204020203" pitchFamily="34" charset="0"/>
+                <a:cs typeface="Segoe UI Light" panose="020B0502040204020203" pitchFamily="34" charset="0"/>
+              </a:rPr>
+              <a:t>Id</a:t>
+            </a:r>
+          </a:p>
+        </p:txBody>
+      </p:sp>
+      <p:pic>
+        <p:nvPicPr>
+          <p:cNvPr id="14" name="Picture 13">
+            <a:extLst>
+              <a:ext uri="{FF2B5EF4-FFF2-40B4-BE49-F238E27FC236}">
+                <a16:creationId xmlns:a16="http://schemas.microsoft.com/office/drawing/2014/main" id="{C65A48A3-61C9-4C3D-B3E9-E28720F234D5}"/>
+              </a:ext>
+            </a:extLst>
+          </p:cNvPr>
+          <p:cNvPicPr>
+            <a:picLocks noChangeAspect="1"/>
+          </p:cNvPicPr>
+          <p:nvPr/>
+        </p:nvPicPr>
+        <p:blipFill>
+          <a:blip r:embed="rId2">
+            <a:extLst>
+              <a:ext uri="{28A0092B-C50C-407E-A947-70E740481C1C}">
+                <a14:useLocalDpi xmlns:a14="http://schemas.microsoft.com/office/drawing/2010/main" val="0"/>
+              </a:ext>
+            </a:extLst>
+          </a:blip>
+          <a:stretch>
+            <a:fillRect/>
+          </a:stretch>
+        </p:blipFill>
+        <p:spPr>
+          <a:xfrm>
+            <a:off x="2569480" y="2495409"/>
+            <a:ext cx="369114" cy="369114"/>
+          </a:xfrm>
+          <a:prstGeom prst="rect">
+            <a:avLst/>
+          </a:prstGeom>
+        </p:spPr>
+      </p:pic>
+      <p:sp>
+        <p:nvSpPr>
+          <p:cNvPr id="36" name="Rectangle 35">
+            <a:extLst>
+              <a:ext uri="{FF2B5EF4-FFF2-40B4-BE49-F238E27FC236}">
+                <a16:creationId xmlns:a16="http://schemas.microsoft.com/office/drawing/2014/main" id="{99C206B6-6AD8-4CCB-B5F5-533411177A4F}"/>
+              </a:ext>
+            </a:extLst>
+          </p:cNvPr>
+          <p:cNvSpPr/>
+          <p:nvPr/>
+        </p:nvSpPr>
+        <p:spPr>
+          <a:xfrm>
+            <a:off x="1057013" y="2914857"/>
+            <a:ext cx="1912690" cy="369115"/>
+          </a:xfrm>
+          <a:prstGeom prst="rect">
+            <a:avLst/>
+          </a:prstGeom>
+        </p:spPr>
+        <p:style>
+          <a:lnRef idx="2">
+            <a:schemeClr val="accent4">
+              <a:shade val="50000"/>
+            </a:schemeClr>
+          </a:lnRef>
+          <a:fillRef idx="1">
+            <a:schemeClr val="accent4"/>
+          </a:fillRef>
+          <a:effectRef idx="0">
+            <a:schemeClr val="accent4"/>
+          </a:effectRef>
+          <a:fontRef idx="minor">
+            <a:schemeClr val="lt1"/>
+          </a:fontRef>
+        </p:style>
+        <p:txBody>
+          <a:bodyPr rtlCol="0" anchor="t"/>
+          <a:lstStyle/>
+          <a:p>
+            <a:pPr algn="just"/>
+            <a:r>
+              <a:rPr lang="en-US" dirty="0">
+                <a:latin typeface="Segoe UI Light" panose="020B0502040204020203" pitchFamily="34" charset="0"/>
+                <a:cs typeface="Segoe UI Light" panose="020B0502040204020203" pitchFamily="34" charset="0"/>
+              </a:rPr>
+              <a:t>Description</a:t>
+            </a:r>
+          </a:p>
+        </p:txBody>
+      </p:sp>
+      <p:sp>
+        <p:nvSpPr>
+          <p:cNvPr id="39" name="Rectangle 38">
+            <a:extLst>
+              <a:ext uri="{FF2B5EF4-FFF2-40B4-BE49-F238E27FC236}">
+                <a16:creationId xmlns:a16="http://schemas.microsoft.com/office/drawing/2014/main" id="{A0A628E5-458B-478A-8F9C-53AB1A86FAE0}"/>
+              </a:ext>
+            </a:extLst>
+          </p:cNvPr>
+          <p:cNvSpPr/>
+          <p:nvPr/>
+        </p:nvSpPr>
+        <p:spPr>
+          <a:xfrm>
+            <a:off x="9171963" y="2424418"/>
+            <a:ext cx="2004969" cy="939151"/>
+          </a:xfrm>
+          <a:prstGeom prst="rect">
+            <a:avLst/>
+          </a:prstGeom>
+        </p:spPr>
+        <p:style>
+          <a:lnRef idx="2">
+            <a:schemeClr val="accent2">
+              <a:shade val="50000"/>
+            </a:schemeClr>
+          </a:lnRef>
+          <a:fillRef idx="1">
+            <a:schemeClr val="accent2"/>
+          </a:fillRef>
+          <a:effectRef idx="0">
+            <a:schemeClr val="accent2"/>
+          </a:effectRef>
+          <a:fontRef idx="minor">
+            <a:schemeClr val="lt1"/>
+          </a:fontRef>
+        </p:style>
+        <p:txBody>
+          <a:bodyPr rtlCol="0" anchor="ctr"/>
+          <a:lstStyle/>
+          <a:p>
+            <a:pPr algn="ctr"/>
+            <a:endParaRPr lang="en-US" dirty="0"/>
+          </a:p>
+        </p:txBody>
+      </p:sp>
+      <p:sp>
+        <p:nvSpPr>
+          <p:cNvPr id="41" name="Rectangle 40">
+            <a:extLst>
+              <a:ext uri="{FF2B5EF4-FFF2-40B4-BE49-F238E27FC236}">
+                <a16:creationId xmlns:a16="http://schemas.microsoft.com/office/drawing/2014/main" id="{F7836305-8009-4CAB-8CD2-8263720DB591}"/>
+              </a:ext>
+            </a:extLst>
+          </p:cNvPr>
+          <p:cNvSpPr/>
+          <p:nvPr/>
+        </p:nvSpPr>
+        <p:spPr>
+          <a:xfrm>
+            <a:off x="9171963" y="2055303"/>
+            <a:ext cx="2004969" cy="369115"/>
+          </a:xfrm>
+          <a:prstGeom prst="rect">
+            <a:avLst/>
+          </a:prstGeom>
+        </p:spPr>
+        <p:style>
+          <a:lnRef idx="2">
+            <a:schemeClr val="accent3">
+              <a:shade val="50000"/>
+            </a:schemeClr>
+          </a:lnRef>
+          <a:fillRef idx="1">
+            <a:schemeClr val="accent3"/>
+          </a:fillRef>
+          <a:effectRef idx="0">
+            <a:schemeClr val="accent3"/>
+          </a:effectRef>
+          <a:fontRef idx="minor">
+            <a:schemeClr val="lt1"/>
+          </a:fontRef>
+        </p:style>
+        <p:txBody>
+          <a:bodyPr rtlCol="0" anchor="ctr"/>
+          <a:lstStyle/>
+          <a:p>
+            <a:pPr algn="ctr"/>
+            <a:r>
+              <a:rPr lang="en-US" dirty="0">
+                <a:latin typeface="Segoe UI Light" panose="020B0502040204020203" pitchFamily="34" charset="0"/>
+                <a:cs typeface="Segoe UI Light" panose="020B0502040204020203" pitchFamily="34" charset="0"/>
+              </a:rPr>
+              <a:t>State</a:t>
+            </a:r>
+          </a:p>
+        </p:txBody>
+      </p:sp>
+      <p:sp>
+        <p:nvSpPr>
+          <p:cNvPr id="42" name="Rectangle 41">
+            <a:extLst>
+              <a:ext uri="{FF2B5EF4-FFF2-40B4-BE49-F238E27FC236}">
+                <a16:creationId xmlns:a16="http://schemas.microsoft.com/office/drawing/2014/main" id="{1F5FC457-6B6F-4F06-9ADE-3B35D002D11C}"/>
+              </a:ext>
+            </a:extLst>
+          </p:cNvPr>
+          <p:cNvSpPr/>
+          <p:nvPr/>
+        </p:nvSpPr>
+        <p:spPr>
+          <a:xfrm>
+            <a:off x="9213908" y="2495409"/>
+            <a:ext cx="1912690" cy="369115"/>
+          </a:xfrm>
+          <a:prstGeom prst="rect">
+            <a:avLst/>
+          </a:prstGeom>
+        </p:spPr>
+        <p:style>
+          <a:lnRef idx="2">
+            <a:schemeClr val="accent4">
+              <a:shade val="50000"/>
+            </a:schemeClr>
+          </a:lnRef>
+          <a:fillRef idx="1">
+            <a:schemeClr val="accent4"/>
+          </a:fillRef>
+          <a:effectRef idx="0">
+            <a:schemeClr val="accent4"/>
+          </a:effectRef>
+          <a:fontRef idx="minor">
+            <a:schemeClr val="lt1"/>
+          </a:fontRef>
+        </p:style>
+        <p:txBody>
+          <a:bodyPr rtlCol="0" anchor="t"/>
+          <a:lstStyle/>
+          <a:p>
+            <a:pPr algn="just"/>
+            <a:r>
+              <a:rPr lang="en-US" dirty="0">
+                <a:latin typeface="Segoe UI Light" panose="020B0502040204020203" pitchFamily="34" charset="0"/>
+                <a:cs typeface="Segoe UI Light" panose="020B0502040204020203" pitchFamily="34" charset="0"/>
+              </a:rPr>
+              <a:t>Id</a:t>
+            </a:r>
+          </a:p>
+        </p:txBody>
+      </p:sp>
+      <p:pic>
+        <p:nvPicPr>
+          <p:cNvPr id="43" name="Picture 42">
+            <a:extLst>
+              <a:ext uri="{FF2B5EF4-FFF2-40B4-BE49-F238E27FC236}">
+                <a16:creationId xmlns:a16="http://schemas.microsoft.com/office/drawing/2014/main" id="{8422D4FB-B248-4AD5-84E5-1E7250399931}"/>
+              </a:ext>
+            </a:extLst>
+          </p:cNvPr>
+          <p:cNvPicPr>
+            <a:picLocks noChangeAspect="1"/>
+          </p:cNvPicPr>
+          <p:nvPr/>
+        </p:nvPicPr>
+        <p:blipFill>
+          <a:blip r:embed="rId2">
+            <a:extLst>
+              <a:ext uri="{28A0092B-C50C-407E-A947-70E740481C1C}">
+                <a14:useLocalDpi xmlns:a14="http://schemas.microsoft.com/office/drawing/2010/main" val="0"/>
+              </a:ext>
+            </a:extLst>
+          </a:blip>
+          <a:stretch>
+            <a:fillRect/>
+          </a:stretch>
+        </p:blipFill>
+        <p:spPr>
+          <a:xfrm>
+            <a:off x="10726375" y="2495409"/>
+            <a:ext cx="369114" cy="369114"/>
+          </a:xfrm>
+          <a:prstGeom prst="rect">
+            <a:avLst/>
+          </a:prstGeom>
+        </p:spPr>
+      </p:pic>
+      <p:sp>
+        <p:nvSpPr>
+          <p:cNvPr id="44" name="Rectangle 43">
+            <a:extLst>
+              <a:ext uri="{FF2B5EF4-FFF2-40B4-BE49-F238E27FC236}">
+                <a16:creationId xmlns:a16="http://schemas.microsoft.com/office/drawing/2014/main" id="{8B2F6FCA-BDF3-4216-B1A0-8766C3B2AE11}"/>
+              </a:ext>
+            </a:extLst>
+          </p:cNvPr>
+          <p:cNvSpPr/>
+          <p:nvPr/>
+        </p:nvSpPr>
+        <p:spPr>
+          <a:xfrm>
+            <a:off x="9213908" y="2914857"/>
+            <a:ext cx="1912690" cy="369115"/>
+          </a:xfrm>
+          <a:prstGeom prst="rect">
+            <a:avLst/>
+          </a:prstGeom>
+        </p:spPr>
+        <p:style>
+          <a:lnRef idx="2">
+            <a:schemeClr val="accent4">
+              <a:shade val="50000"/>
+            </a:schemeClr>
+          </a:lnRef>
+          <a:fillRef idx="1">
+            <a:schemeClr val="accent4"/>
+          </a:fillRef>
+          <a:effectRef idx="0">
+            <a:schemeClr val="accent4"/>
+          </a:effectRef>
+          <a:fontRef idx="minor">
+            <a:schemeClr val="lt1"/>
+          </a:fontRef>
+        </p:style>
+        <p:txBody>
+          <a:bodyPr rtlCol="0" anchor="t"/>
+          <a:lstStyle/>
+          <a:p>
+            <a:pPr algn="just"/>
+            <a:r>
+              <a:rPr lang="en-US" dirty="0">
+                <a:latin typeface="Segoe UI Light" panose="020B0502040204020203" pitchFamily="34" charset="0"/>
+                <a:cs typeface="Segoe UI Light" panose="020B0502040204020203" pitchFamily="34" charset="0"/>
+              </a:rPr>
+              <a:t>Acronym</a:t>
+            </a:r>
+          </a:p>
+        </p:txBody>
+      </p:sp>
+      <p:sp>
+        <p:nvSpPr>
+          <p:cNvPr id="45" name="Rectangle 44">
+            <a:extLst>
+              <a:ext uri="{FF2B5EF4-FFF2-40B4-BE49-F238E27FC236}">
+                <a16:creationId xmlns:a16="http://schemas.microsoft.com/office/drawing/2014/main" id="{6CBEE1F5-A5E6-4F8E-8AE5-C64FCD8A4E36}"/>
+              </a:ext>
+            </a:extLst>
+          </p:cNvPr>
+          <p:cNvSpPr/>
+          <p:nvPr/>
+        </p:nvSpPr>
+        <p:spPr>
+          <a:xfrm>
+            <a:off x="5093515" y="3429001"/>
+            <a:ext cx="2004969" cy="930546"/>
+          </a:xfrm>
+          <a:prstGeom prst="rect">
+            <a:avLst/>
+          </a:prstGeom>
+        </p:spPr>
+        <p:style>
+          <a:lnRef idx="2">
+            <a:schemeClr val="accent2">
+              <a:shade val="50000"/>
+            </a:schemeClr>
+          </a:lnRef>
+          <a:fillRef idx="1">
+            <a:schemeClr val="accent2"/>
+          </a:fillRef>
+          <a:effectRef idx="0">
+            <a:schemeClr val="accent2"/>
+          </a:effectRef>
+          <a:fontRef idx="minor">
+            <a:schemeClr val="lt1"/>
+          </a:fontRef>
+        </p:style>
+        <p:txBody>
+          <a:bodyPr rtlCol="0" anchor="ctr"/>
+          <a:lstStyle/>
+          <a:p>
+            <a:pPr algn="ctr"/>
+            <a:endParaRPr lang="en-US" dirty="0"/>
+          </a:p>
+        </p:txBody>
+      </p:sp>
+      <p:sp>
+        <p:nvSpPr>
+          <p:cNvPr id="46" name="Rectangle 45">
+            <a:extLst>
+              <a:ext uri="{FF2B5EF4-FFF2-40B4-BE49-F238E27FC236}">
+                <a16:creationId xmlns:a16="http://schemas.microsoft.com/office/drawing/2014/main" id="{0ADEF5AB-AE26-47A3-B3D8-49DC94CFA338}"/>
+              </a:ext>
+            </a:extLst>
+          </p:cNvPr>
+          <p:cNvSpPr/>
+          <p:nvPr/>
+        </p:nvSpPr>
+        <p:spPr>
+          <a:xfrm>
+            <a:off x="5093515" y="3059885"/>
+            <a:ext cx="2004969" cy="369115"/>
+          </a:xfrm>
+          <a:prstGeom prst="rect">
+            <a:avLst/>
+          </a:prstGeom>
+        </p:spPr>
+        <p:style>
+          <a:lnRef idx="2">
+            <a:schemeClr val="accent3">
+              <a:shade val="50000"/>
+            </a:schemeClr>
+          </a:lnRef>
+          <a:fillRef idx="1">
+            <a:schemeClr val="accent3"/>
+          </a:fillRef>
+          <a:effectRef idx="0">
+            <a:schemeClr val="accent3"/>
+          </a:effectRef>
+          <a:fontRef idx="minor">
+            <a:schemeClr val="lt1"/>
+          </a:fontRef>
+        </p:style>
+        <p:txBody>
+          <a:bodyPr rtlCol="0" anchor="ctr"/>
+          <a:lstStyle/>
+          <a:p>
+            <a:pPr algn="ctr"/>
+            <a:r>
+              <a:rPr lang="en-US" sz="1600" dirty="0" err="1">
+                <a:latin typeface="Segoe UI Light" panose="020B0502040204020203" pitchFamily="34" charset="0"/>
+                <a:cs typeface="Segoe UI Light" panose="020B0502040204020203" pitchFamily="34" charset="0"/>
+              </a:rPr>
+              <a:t>AssocMessageState</a:t>
+            </a:r>
+            <a:endParaRPr lang="en-US" sz="1600" dirty="0">
+              <a:latin typeface="Segoe UI Light" panose="020B0502040204020203" pitchFamily="34" charset="0"/>
+              <a:cs typeface="Segoe UI Light" panose="020B0502040204020203" pitchFamily="34" charset="0"/>
+            </a:endParaRPr>
+          </a:p>
+        </p:txBody>
+      </p:sp>
+      <p:sp>
+        <p:nvSpPr>
+          <p:cNvPr id="47" name="Rectangle 46">
+            <a:extLst>
+              <a:ext uri="{FF2B5EF4-FFF2-40B4-BE49-F238E27FC236}">
+                <a16:creationId xmlns:a16="http://schemas.microsoft.com/office/drawing/2014/main" id="{E3B3D67E-CDEB-4F3C-901D-937FF884FFB1}"/>
+              </a:ext>
+            </a:extLst>
+          </p:cNvPr>
+          <p:cNvSpPr/>
+          <p:nvPr/>
+        </p:nvSpPr>
+        <p:spPr>
+          <a:xfrm>
+            <a:off x="5135460" y="3499991"/>
+            <a:ext cx="1912690" cy="369115"/>
+          </a:xfrm>
+          <a:prstGeom prst="rect">
+            <a:avLst/>
+          </a:prstGeom>
+        </p:spPr>
+        <p:style>
+          <a:lnRef idx="2">
+            <a:schemeClr val="accent4">
+              <a:shade val="50000"/>
+            </a:schemeClr>
+          </a:lnRef>
+          <a:fillRef idx="1">
+            <a:schemeClr val="accent4"/>
+          </a:fillRef>
+          <a:effectRef idx="0">
+            <a:schemeClr val="accent4"/>
+          </a:effectRef>
+          <a:fontRef idx="minor">
+            <a:schemeClr val="lt1"/>
+          </a:fontRef>
+        </p:style>
+        <p:txBody>
+          <a:bodyPr rtlCol="0" anchor="t"/>
+          <a:lstStyle/>
+          <a:p>
+            <a:pPr algn="just"/>
+            <a:r>
+              <a:rPr lang="en-US" dirty="0" err="1">
+                <a:latin typeface="Segoe UI Light" panose="020B0502040204020203" pitchFamily="34" charset="0"/>
+                <a:cs typeface="Segoe UI Light" panose="020B0502040204020203" pitchFamily="34" charset="0"/>
+              </a:rPr>
+              <a:t>MessageId</a:t>
+            </a:r>
+            <a:endParaRPr lang="en-US" dirty="0">
+              <a:latin typeface="Segoe UI Light" panose="020B0502040204020203" pitchFamily="34" charset="0"/>
+              <a:cs typeface="Segoe UI Light" panose="020B0502040204020203" pitchFamily="34" charset="0"/>
+            </a:endParaRPr>
+          </a:p>
+        </p:txBody>
+      </p:sp>
+      <p:pic>
+        <p:nvPicPr>
+          <p:cNvPr id="48" name="Picture 47">
+            <a:extLst>
+              <a:ext uri="{FF2B5EF4-FFF2-40B4-BE49-F238E27FC236}">
+                <a16:creationId xmlns:a16="http://schemas.microsoft.com/office/drawing/2014/main" id="{0B908255-D285-4BFE-B1EC-9639B3D10739}"/>
+              </a:ext>
+            </a:extLst>
+          </p:cNvPr>
+          <p:cNvPicPr>
+            <a:picLocks noChangeAspect="1"/>
+          </p:cNvPicPr>
+          <p:nvPr/>
+        </p:nvPicPr>
+        <p:blipFill>
+          <a:blip r:embed="rId2">
+            <a:extLst>
+              <a:ext uri="{28A0092B-C50C-407E-A947-70E740481C1C}">
+                <a14:useLocalDpi xmlns:a14="http://schemas.microsoft.com/office/drawing/2010/main" val="0"/>
+              </a:ext>
+            </a:extLst>
+          </a:blip>
+          <a:stretch>
+            <a:fillRect/>
+          </a:stretch>
+        </p:blipFill>
+        <p:spPr>
+          <a:xfrm>
+            <a:off x="6647927" y="3499991"/>
+            <a:ext cx="369114" cy="369114"/>
+          </a:xfrm>
+          <a:prstGeom prst="rect">
+            <a:avLst/>
+          </a:prstGeom>
+        </p:spPr>
+      </p:pic>
+      <p:sp>
+        <p:nvSpPr>
+          <p:cNvPr id="49" name="Rectangle 48">
+            <a:extLst>
+              <a:ext uri="{FF2B5EF4-FFF2-40B4-BE49-F238E27FC236}">
+                <a16:creationId xmlns:a16="http://schemas.microsoft.com/office/drawing/2014/main" id="{BEF672A9-1384-4B10-9271-00517B761FFD}"/>
+              </a:ext>
+            </a:extLst>
+          </p:cNvPr>
+          <p:cNvSpPr/>
+          <p:nvPr/>
+        </p:nvSpPr>
+        <p:spPr>
+          <a:xfrm>
+            <a:off x="5135460" y="3919439"/>
+            <a:ext cx="1912690" cy="369115"/>
+          </a:xfrm>
+          <a:prstGeom prst="rect">
+            <a:avLst/>
+          </a:prstGeom>
+        </p:spPr>
+        <p:style>
+          <a:lnRef idx="2">
+            <a:schemeClr val="accent4">
+              <a:shade val="50000"/>
+            </a:schemeClr>
+          </a:lnRef>
+          <a:fillRef idx="1">
+            <a:schemeClr val="accent4"/>
+          </a:fillRef>
+          <a:effectRef idx="0">
+            <a:schemeClr val="accent4"/>
+          </a:effectRef>
+          <a:fontRef idx="minor">
+            <a:schemeClr val="lt1"/>
+          </a:fontRef>
+        </p:style>
+        <p:txBody>
+          <a:bodyPr rtlCol="0" anchor="t"/>
+          <a:lstStyle/>
+          <a:p>
+            <a:pPr algn="just"/>
+            <a:r>
+              <a:rPr lang="en-US" dirty="0" err="1">
+                <a:latin typeface="Segoe UI Light" panose="020B0502040204020203" pitchFamily="34" charset="0"/>
+                <a:cs typeface="Segoe UI Light" panose="020B0502040204020203" pitchFamily="34" charset="0"/>
+              </a:rPr>
+              <a:t>StateId</a:t>
+            </a:r>
+            <a:endParaRPr lang="en-US" dirty="0">
+              <a:latin typeface="Segoe UI Light" panose="020B0502040204020203" pitchFamily="34" charset="0"/>
+              <a:cs typeface="Segoe UI Light" panose="020B0502040204020203" pitchFamily="34" charset="0"/>
+            </a:endParaRPr>
+          </a:p>
+        </p:txBody>
+      </p:sp>
+      <p:pic>
+        <p:nvPicPr>
+          <p:cNvPr id="50" name="Picture 49">
+            <a:extLst>
+              <a:ext uri="{FF2B5EF4-FFF2-40B4-BE49-F238E27FC236}">
+                <a16:creationId xmlns:a16="http://schemas.microsoft.com/office/drawing/2014/main" id="{D13D471B-A460-4F2C-9306-DA69E4E9729B}"/>
+              </a:ext>
+            </a:extLst>
+          </p:cNvPr>
+          <p:cNvPicPr>
+            <a:picLocks noChangeAspect="1"/>
+          </p:cNvPicPr>
+          <p:nvPr/>
+        </p:nvPicPr>
+        <p:blipFill>
+          <a:blip r:embed="rId2">
+            <a:extLst>
+              <a:ext uri="{28A0092B-C50C-407E-A947-70E740481C1C}">
+                <a14:useLocalDpi xmlns:a14="http://schemas.microsoft.com/office/drawing/2010/main" val="0"/>
+              </a:ext>
+            </a:extLst>
+          </a:blip>
+          <a:stretch>
+            <a:fillRect/>
+          </a:stretch>
+        </p:blipFill>
+        <p:spPr>
+          <a:xfrm>
+            <a:off x="6647927" y="3917757"/>
+            <a:ext cx="369114" cy="369114"/>
+          </a:xfrm>
+          <a:prstGeom prst="rect">
+            <a:avLst/>
+          </a:prstGeom>
+        </p:spPr>
+      </p:pic>
+      <p:cxnSp>
+        <p:nvCxnSpPr>
+          <p:cNvPr id="17" name="Straight Arrow Connector 16">
+            <a:extLst>
+              <a:ext uri="{FF2B5EF4-FFF2-40B4-BE49-F238E27FC236}">
+                <a16:creationId xmlns:a16="http://schemas.microsoft.com/office/drawing/2014/main" id="{F7719176-6EBB-4905-B95D-BF9BE67B306E}"/>
+              </a:ext>
+            </a:extLst>
+          </p:cNvPr>
+          <p:cNvCxnSpPr>
+            <a:stCxn id="33" idx="3"/>
+            <a:endCxn id="47" idx="1"/>
+          </p:cNvCxnSpPr>
+          <p:nvPr/>
+        </p:nvCxnSpPr>
+        <p:spPr>
+          <a:xfrm>
+            <a:off x="2969703" y="2679967"/>
+            <a:ext cx="2165757" cy="1004582"/>
+          </a:xfrm>
+          <a:prstGeom prst="straightConnector1">
+            <a:avLst/>
+          </a:prstGeom>
+          <a:ln w="28575">
+            <a:tailEnd type="triangle"/>
+          </a:ln>
+        </p:spPr>
+        <p:style>
+          <a:lnRef idx="1">
+            <a:schemeClr val="dk1"/>
+          </a:lnRef>
+          <a:fillRef idx="0">
+            <a:schemeClr val="dk1"/>
+          </a:fillRef>
+          <a:effectRef idx="0">
+            <a:schemeClr val="dk1"/>
+          </a:effectRef>
+          <a:fontRef idx="minor">
+            <a:schemeClr val="tx1"/>
+          </a:fontRef>
+        </p:style>
+      </p:cxnSp>
+      <p:cxnSp>
+        <p:nvCxnSpPr>
+          <p:cNvPr id="51" name="Straight Arrow Connector 50">
+            <a:extLst>
+              <a:ext uri="{FF2B5EF4-FFF2-40B4-BE49-F238E27FC236}">
+                <a16:creationId xmlns:a16="http://schemas.microsoft.com/office/drawing/2014/main" id="{8533B856-53B6-42AE-B45E-B82302016B79}"/>
+              </a:ext>
+            </a:extLst>
+          </p:cNvPr>
+          <p:cNvCxnSpPr>
+            <a:cxnSpLocks/>
+            <a:stCxn id="42" idx="1"/>
+            <a:endCxn id="49" idx="3"/>
+          </p:cNvCxnSpPr>
+          <p:nvPr/>
+        </p:nvCxnSpPr>
+        <p:spPr>
+          <a:xfrm flipH="1">
+            <a:off x="7048150" y="2679967"/>
+            <a:ext cx="2165758" cy="1424030"/>
+          </a:xfrm>
+          <a:prstGeom prst="straightConnector1">
+            <a:avLst/>
+          </a:prstGeom>
+          <a:ln w="28575">
+            <a:tailEnd type="triangle"/>
+          </a:ln>
+        </p:spPr>
+        <p:style>
+          <a:lnRef idx="1">
+            <a:schemeClr val="dk1"/>
+          </a:lnRef>
+          <a:fillRef idx="0">
+            <a:schemeClr val="dk1"/>
+          </a:fillRef>
+          <a:effectRef idx="0">
+            <a:schemeClr val="dk1"/>
+          </a:effectRef>
+          <a:fontRef idx="minor">
+            <a:schemeClr val="tx1"/>
+          </a:fontRef>
+        </p:style>
+      </p:cxnSp>
+      <p:pic>
+        <p:nvPicPr>
+          <p:cNvPr id="53" name="Picture 52">
+            <a:extLst>
+              <a:ext uri="{FF2B5EF4-FFF2-40B4-BE49-F238E27FC236}">
+                <a16:creationId xmlns:a16="http://schemas.microsoft.com/office/drawing/2014/main" id="{246A47AD-E8E6-4946-92D6-8328A55B342D}"/>
+              </a:ext>
+            </a:extLst>
+          </p:cNvPr>
+          <p:cNvPicPr>
+            <a:picLocks noChangeAspect="1"/>
+          </p:cNvPicPr>
+          <p:nvPr/>
+        </p:nvPicPr>
+        <p:blipFill>
+          <a:blip r:embed="rId3">
+            <a:extLst>
+              <a:ext uri="{28A0092B-C50C-407E-A947-70E740481C1C}">
+                <a14:useLocalDpi xmlns:a14="http://schemas.microsoft.com/office/drawing/2010/main" val="0"/>
+              </a:ext>
+            </a:extLst>
+          </a:blip>
+          <a:stretch>
+            <a:fillRect/>
+          </a:stretch>
+        </p:blipFill>
+        <p:spPr>
+          <a:xfrm rot="5400000">
+            <a:off x="6269831" y="3940096"/>
+            <a:ext cx="327762" cy="327762"/>
+          </a:xfrm>
+          <a:prstGeom prst="rect">
+            <a:avLst/>
+          </a:prstGeom>
+        </p:spPr>
+      </p:pic>
+      <p:pic>
+        <p:nvPicPr>
+          <p:cNvPr id="24" name="Picture 23">
+            <a:extLst>
+              <a:ext uri="{FF2B5EF4-FFF2-40B4-BE49-F238E27FC236}">
+                <a16:creationId xmlns:a16="http://schemas.microsoft.com/office/drawing/2014/main" id="{A875E49C-65EF-40A5-9205-E9171A303DE3}"/>
+              </a:ext>
+            </a:extLst>
+          </p:cNvPr>
+          <p:cNvPicPr>
+            <a:picLocks noChangeAspect="1"/>
+          </p:cNvPicPr>
+          <p:nvPr/>
+        </p:nvPicPr>
+        <p:blipFill>
+          <a:blip r:embed="rId3">
+            <a:extLst>
+              <a:ext uri="{28A0092B-C50C-407E-A947-70E740481C1C}">
+                <a14:useLocalDpi xmlns:a14="http://schemas.microsoft.com/office/drawing/2010/main" val="0"/>
+              </a:ext>
+            </a:extLst>
+          </a:blip>
+          <a:stretch>
+            <a:fillRect/>
+          </a:stretch>
+        </p:blipFill>
+        <p:spPr>
+          <a:xfrm rot="5400000">
+            <a:off x="2591607" y="2936171"/>
+            <a:ext cx="327762" cy="327762"/>
+          </a:xfrm>
+          <a:prstGeom prst="rect">
+            <a:avLst/>
+          </a:prstGeom>
+        </p:spPr>
+      </p:pic>
+      <p:pic>
+        <p:nvPicPr>
+          <p:cNvPr id="25" name="Picture 24">
+            <a:extLst>
+              <a:ext uri="{FF2B5EF4-FFF2-40B4-BE49-F238E27FC236}">
+                <a16:creationId xmlns:a16="http://schemas.microsoft.com/office/drawing/2014/main" id="{D0B59136-8442-4B27-968B-2264892F33AF}"/>
+              </a:ext>
+            </a:extLst>
+          </p:cNvPr>
+          <p:cNvPicPr>
+            <a:picLocks noChangeAspect="1"/>
+          </p:cNvPicPr>
+          <p:nvPr/>
+        </p:nvPicPr>
+        <p:blipFill>
+          <a:blip r:embed="rId3">
+            <a:extLst>
+              <a:ext uri="{28A0092B-C50C-407E-A947-70E740481C1C}">
+                <a14:useLocalDpi xmlns:a14="http://schemas.microsoft.com/office/drawing/2010/main" val="0"/>
+              </a:ext>
+            </a:extLst>
+          </a:blip>
+          <a:stretch>
+            <a:fillRect/>
+          </a:stretch>
+        </p:blipFill>
+        <p:spPr>
+          <a:xfrm rot="5400000">
+            <a:off x="10747051" y="2906975"/>
+            <a:ext cx="327762" cy="327762"/>
+          </a:xfrm>
+          <a:prstGeom prst="rect">
+            <a:avLst/>
+          </a:prstGeom>
+        </p:spPr>
+      </p:pic>
+    </p:spTree>
+    <p:extLst>
+      <p:ext uri="{BB962C8B-B14F-4D97-AF65-F5344CB8AC3E}">
+        <p14:creationId xmlns:p14="http://schemas.microsoft.com/office/powerpoint/2010/main" val="3375822404"/>
+      </p:ext>
+    </p:extLst>
+  </p:cSld>
+  <p:clrMapOvr>
+    <a:masterClrMapping/>
+  </p:clrMapOvr>
+</p:sld>
+</file>
+
 <file path=ppt/theme/theme1.xml><?xml version="1.0" encoding="utf-8"?>
 <a:theme xmlns:a="http://schemas.openxmlformats.org/drawingml/2006/main" name="Office Theme">
   <a:themeElements>

</xml_diff>